<commit_message>
tuned the best model
</commit_message>
<xml_diff>
--- a/Presentation/melbourne_cbd_template.pptx
+++ b/Presentation/melbourne_cbd_template.pptx
@@ -2,7 +2,7 @@
 <file path=ppt/presentation.xml><?xml version="1.0" encoding="utf-8"?>
 <p:presentation xmlns:a="http://schemas.openxmlformats.org/drawingml/2006/main" xmlns:r="http://schemas.openxmlformats.org/officeDocument/2006/relationships" xmlns:p="http://schemas.openxmlformats.org/presentationml/2006/main" saveSubsetFonts="1" autoCompressPictures="0">
   <p:sldMasterIdLst>
-    <p:sldMasterId id="2147483802" r:id="rId1"/>
+    <p:sldMasterId id="2147483868" r:id="rId1"/>
   </p:sldMasterIdLst>
   <p:notesMasterIdLst>
     <p:notesMasterId r:id="rId9"/>
@@ -214,7 +214,7 @@
           <a:p>
             <a:fld id="{FBAA9256-2230-4E9D-83AF-6C53407F50CC}" type="datetimeFigureOut">
               <a:rPr lang="en-AU" smtClean="0"/>
-              <a:t>4/11/2023</a:t>
+              <a:t>5/11/2023</a:t>
             </a:fld>
             <a:endParaRPr lang="en-AU"/>
           </a:p>
@@ -485,16 +485,6 @@
 <file path=ppt/slideLayouts/slideLayout1.xml><?xml version="1.0" encoding="utf-8"?>
 <p:sldLayout xmlns:a="http://schemas.openxmlformats.org/drawingml/2006/main" xmlns:r="http://schemas.openxmlformats.org/officeDocument/2006/relationships" xmlns:p="http://schemas.openxmlformats.org/presentationml/2006/main" showMasterSp="0" type="title" preserve="1">
   <p:cSld name="Title Slide">
-    <p:bg>
-      <p:bgPr>
-        <a:solidFill>
-          <a:schemeClr val="bg2">
-            <a:lumMod val="75000"/>
-          </a:schemeClr>
-        </a:solidFill>
-        <a:effectLst/>
-      </p:bgPr>
-    </p:bg>
     <p:spTree>
       <p:nvGrpSpPr>
         <p:cNvPr id="1" name=""/>
@@ -511,128 +501,52 @@
       </p:grpSpPr>
       <p:sp>
         <p:nvSpPr>
-          <p:cNvPr id="2" name="Title 1"/>
-          <p:cNvSpPr>
-            <a:spLocks noGrp="1"/>
-          </p:cNvSpPr>
-          <p:nvPr>
-            <p:ph type="ctrTitle"/>
-          </p:nvPr>
-        </p:nvSpPr>
-        <p:spPr>
-          <a:xfrm>
-            <a:off x="946404" y="758952"/>
-            <a:ext cx="7063740" cy="4041648"/>
-          </a:xfrm>
-        </p:spPr>
-        <p:txBody>
-          <a:bodyPr anchor="b">
-            <a:normAutofit/>
-          </a:bodyPr>
-          <a:lstStyle>
-            <a:lvl1pPr algn="l">
-              <a:lnSpc>
-                <a:spcPct val="85000"/>
-              </a:lnSpc>
-              <a:defRPr sz="6600" baseline="0">
-                <a:solidFill>
-                  <a:schemeClr val="tx1"/>
-                </a:solidFill>
-              </a:defRPr>
-            </a:lvl1pPr>
-          </a:lstStyle>
-          <a:p>
-            <a:r>
-              <a:rPr lang="en-US"/>
-              <a:t>Click to edit Master title style</a:t>
-            </a:r>
-            <a:endParaRPr lang="en-US" dirty="0"/>
-          </a:p>
-        </p:txBody>
-      </p:sp>
-      <p:sp>
-        <p:nvSpPr>
-          <p:cNvPr id="3" name="Subtitle 2"/>
-          <p:cNvSpPr>
-            <a:spLocks noGrp="1"/>
-          </p:cNvSpPr>
-          <p:nvPr>
-            <p:ph type="subTitle" idx="1"/>
-          </p:nvPr>
-        </p:nvSpPr>
-        <p:spPr>
-          <a:xfrm>
-            <a:off x="946404" y="4800600"/>
-            <a:ext cx="7063740" cy="1691640"/>
-          </a:xfrm>
-        </p:spPr>
-        <p:txBody>
-          <a:bodyPr>
-            <a:normAutofit/>
-          </a:bodyPr>
-          <a:lstStyle>
-            <a:lvl1pPr marL="0" indent="0" algn="l">
-              <a:buNone/>
-              <a:defRPr sz="2000" baseline="0">
-                <a:solidFill>
-                  <a:schemeClr val="tx1">
-                    <a:lumMod val="85000"/>
-                  </a:schemeClr>
-                </a:solidFill>
-              </a:defRPr>
-            </a:lvl1pPr>
-            <a:lvl2pPr marL="457200" indent="0" algn="ctr">
-              <a:buNone/>
-              <a:defRPr sz="2000"/>
-            </a:lvl2pPr>
-            <a:lvl3pPr marL="914400" indent="0" algn="ctr">
-              <a:buNone/>
-              <a:defRPr sz="2000"/>
-            </a:lvl3pPr>
-            <a:lvl4pPr marL="1371600" indent="0" algn="ctr">
-              <a:buNone/>
-              <a:defRPr sz="2000"/>
-            </a:lvl4pPr>
-            <a:lvl5pPr marL="1828800" indent="0" algn="ctr">
-              <a:buNone/>
-              <a:defRPr sz="2000"/>
-            </a:lvl5pPr>
-            <a:lvl6pPr marL="2286000" indent="0" algn="ctr">
-              <a:buNone/>
-              <a:defRPr sz="2000"/>
-            </a:lvl6pPr>
-            <a:lvl7pPr marL="2743200" indent="0" algn="ctr">
-              <a:buNone/>
-              <a:defRPr sz="2000"/>
-            </a:lvl7pPr>
-            <a:lvl8pPr marL="3200400" indent="0" algn="ctr">
-              <a:buNone/>
-              <a:defRPr sz="2000"/>
-            </a:lvl8pPr>
-            <a:lvl9pPr marL="3657600" indent="0" algn="ctr">
-              <a:buNone/>
-              <a:defRPr sz="2000"/>
-            </a:lvl9pPr>
-          </a:lstStyle>
-          <a:p>
-            <a:r>
-              <a:rPr lang="en-US"/>
-              <a:t>Click to edit Master subtitle style</a:t>
-            </a:r>
-            <a:endParaRPr lang="en-US" dirty="0"/>
-          </a:p>
-        </p:txBody>
-      </p:sp>
-      <p:sp>
-        <p:nvSpPr>
           <p:cNvPr id="7" name="Rectangle 6"/>
           <p:cNvSpPr/>
           <p:nvPr/>
         </p:nvSpPr>
         <p:spPr>
           <a:xfrm>
-            <a:off x="0" y="0"/>
-            <a:ext cx="342900" cy="6858000"/>
+            <a:off x="2382" y="6400800"/>
+            <a:ext cx="9141619" cy="457200"/>
+          </a:xfrm>
+          <a:prstGeom prst="rect">
+            <a:avLst/>
+          </a:prstGeom>
+          <a:solidFill>
+            <a:schemeClr val="accent2"/>
+          </a:solidFill>
+          <a:ln>
+            <a:noFill/>
+          </a:ln>
+        </p:spPr>
+        <p:style>
+          <a:lnRef idx="2">
+            <a:schemeClr val="accent1">
+              <a:shade val="50000"/>
+            </a:schemeClr>
+          </a:lnRef>
+          <a:fillRef idx="1">
+            <a:schemeClr val="accent1"/>
+          </a:fillRef>
+          <a:effectRef idx="0">
+            <a:schemeClr val="accent1"/>
+          </a:effectRef>
+          <a:fontRef idx="minor">
+            <a:schemeClr val="lt1"/>
+          </a:fontRef>
+        </p:style>
+      </p:sp>
+      <p:sp>
+        <p:nvSpPr>
+          <p:cNvPr id="8" name="Rectangle 7"/>
+          <p:cNvSpPr/>
+          <p:nvPr/>
+        </p:nvSpPr>
+        <p:spPr>
+          <a:xfrm>
+            <a:off x="12" y="6334316"/>
+            <a:ext cx="9141619" cy="64008"/>
           </a:xfrm>
           <a:prstGeom prst="rect">
             <a:avLst/>
@@ -663,33 +577,138 @@
       </p:sp>
       <p:sp>
         <p:nvSpPr>
-          <p:cNvPr id="8" name="Date Placeholder 7"/>
-          <p:cNvSpPr>
-            <a:spLocks noGrp="1"/>
-          </p:cNvSpPr>
-          <p:nvPr>
-            <p:ph type="dt" sz="half" idx="10"/>
-          </p:nvPr>
-        </p:nvSpPr>
-        <p:spPr/>
-        <p:txBody>
-          <a:bodyPr/>
+          <p:cNvPr id="2" name="Title 1"/>
+          <p:cNvSpPr>
+            <a:spLocks noGrp="1"/>
+          </p:cNvSpPr>
+          <p:nvPr>
+            <p:ph type="ctrTitle"/>
+          </p:nvPr>
+        </p:nvSpPr>
+        <p:spPr>
+          <a:xfrm>
+            <a:off x="822960" y="758952"/>
+            <a:ext cx="7543800" cy="3566160"/>
+          </a:xfrm>
+        </p:spPr>
+        <p:txBody>
+          <a:bodyPr anchor="b">
+            <a:normAutofit/>
+          </a:bodyPr>
           <a:lstStyle>
-            <a:lvl1pPr>
-              <a:defRPr>
+            <a:lvl1pPr algn="l">
+              <a:lnSpc>
+                <a:spcPct val="85000"/>
+              </a:lnSpc>
+              <a:defRPr sz="8000" spc="-50" baseline="0">
                 <a:solidFill>
-                  <a:schemeClr val="bg2">
-                    <a:lumMod val="20000"/>
-                    <a:lumOff val="80000"/>
+                  <a:schemeClr val="tx1">
+                    <a:lumMod val="85000"/>
+                    <a:lumOff val="15000"/>
                   </a:schemeClr>
                 </a:solidFill>
               </a:defRPr>
             </a:lvl1pPr>
           </a:lstStyle>
           <a:p>
+            <a:r>
+              <a:rPr lang="en-US"/>
+              <a:t>Click to edit Master title style</a:t>
+            </a:r>
+            <a:endParaRPr lang="en-US" dirty="0"/>
+          </a:p>
+        </p:txBody>
+      </p:sp>
+      <p:sp>
+        <p:nvSpPr>
+          <p:cNvPr id="3" name="Subtitle 2"/>
+          <p:cNvSpPr>
+            <a:spLocks noGrp="1"/>
+          </p:cNvSpPr>
+          <p:nvPr>
+            <p:ph type="subTitle" idx="1"/>
+          </p:nvPr>
+        </p:nvSpPr>
+        <p:spPr>
+          <a:xfrm>
+            <a:off x="825038" y="4455621"/>
+            <a:ext cx="7543800" cy="1143000"/>
+          </a:xfrm>
+        </p:spPr>
+        <p:txBody>
+          <a:bodyPr lIns="91440" rIns="91440">
+            <a:normAutofit/>
+          </a:bodyPr>
+          <a:lstStyle>
+            <a:lvl1pPr marL="0" indent="0" algn="l">
+              <a:buNone/>
+              <a:defRPr sz="2400" cap="all" spc="200" baseline="0">
+                <a:solidFill>
+                  <a:schemeClr val="tx2"/>
+                </a:solidFill>
+                <a:latin typeface="+mj-lt"/>
+              </a:defRPr>
+            </a:lvl1pPr>
+            <a:lvl2pPr marL="457200" indent="0" algn="ctr">
+              <a:buNone/>
+              <a:defRPr sz="2400"/>
+            </a:lvl2pPr>
+            <a:lvl3pPr marL="914400" indent="0" algn="ctr">
+              <a:buNone/>
+              <a:defRPr sz="2400"/>
+            </a:lvl3pPr>
+            <a:lvl4pPr marL="1371600" indent="0" algn="ctr">
+              <a:buNone/>
+              <a:defRPr sz="2000"/>
+            </a:lvl4pPr>
+            <a:lvl5pPr marL="1828800" indent="0" algn="ctr">
+              <a:buNone/>
+              <a:defRPr sz="2000"/>
+            </a:lvl5pPr>
+            <a:lvl6pPr marL="2286000" indent="0" algn="ctr">
+              <a:buNone/>
+              <a:defRPr sz="2000"/>
+            </a:lvl6pPr>
+            <a:lvl7pPr marL="2743200" indent="0" algn="ctr">
+              <a:buNone/>
+              <a:defRPr sz="2000"/>
+            </a:lvl7pPr>
+            <a:lvl8pPr marL="3200400" indent="0" algn="ctr">
+              <a:buNone/>
+              <a:defRPr sz="2000"/>
+            </a:lvl8pPr>
+            <a:lvl9pPr marL="3657600" indent="0" algn="ctr">
+              <a:buNone/>
+              <a:defRPr sz="2000"/>
+            </a:lvl9pPr>
+          </a:lstStyle>
+          <a:p>
+            <a:r>
+              <a:rPr lang="en-US"/>
+              <a:t>Click to edit Master subtitle style</a:t>
+            </a:r>
+            <a:endParaRPr lang="en-US" dirty="0"/>
+          </a:p>
+        </p:txBody>
+      </p:sp>
+      <p:sp>
+        <p:nvSpPr>
+          <p:cNvPr id="4" name="Date Placeholder 3"/>
+          <p:cNvSpPr>
+            <a:spLocks noGrp="1"/>
+          </p:cNvSpPr>
+          <p:nvPr>
+            <p:ph type="dt" sz="half" idx="10"/>
+          </p:nvPr>
+        </p:nvSpPr>
+        <p:spPr/>
+        <p:txBody>
+          <a:bodyPr/>
+          <a:lstStyle/>
+          <a:p>
             <a:fld id="{5BCAD085-E8A6-8845-BD4E-CB4CCA059FC4}" type="datetimeFigureOut">
               <a:rPr lang="en-US" smtClean="0"/>
-              <a:t>11/4/2023</a:t>
+              <a:t>11/5/2023</a:t>
             </a:fld>
             <a:endParaRPr lang="en-US"/>
           </a:p>
@@ -697,7 +716,7 @@
       </p:sp>
       <p:sp>
         <p:nvSpPr>
-          <p:cNvPr id="9" name="Footer Placeholder 8"/>
+          <p:cNvPr id="5" name="Footer Placeholder 4"/>
           <p:cNvSpPr>
             <a:spLocks noGrp="1"/>
           </p:cNvSpPr>
@@ -708,18 +727,7 @@
         <p:spPr/>
         <p:txBody>
           <a:bodyPr/>
-          <a:lstStyle>
-            <a:lvl1pPr>
-              <a:defRPr>
-                <a:solidFill>
-                  <a:schemeClr val="bg2">
-                    <a:lumMod val="20000"/>
-                    <a:lumOff val="80000"/>
-                  </a:schemeClr>
-                </a:solidFill>
-              </a:defRPr>
-            </a:lvl1pPr>
-          </a:lstStyle>
+          <a:lstStyle/>
           <a:p>
             <a:endParaRPr lang="en-US"/>
           </a:p>
@@ -727,7 +735,7 @@
       </p:sp>
       <p:sp>
         <p:nvSpPr>
-          <p:cNvPr id="10" name="Slide Number Placeholder 9"/>
+          <p:cNvPr id="6" name="Slide Number Placeholder 5"/>
           <p:cNvSpPr>
             <a:spLocks noGrp="1"/>
           </p:cNvSpPr>
@@ -738,18 +746,7 @@
         <p:spPr/>
         <p:txBody>
           <a:bodyPr/>
-          <a:lstStyle>
-            <a:lvl1pPr>
-              <a:defRPr>
-                <a:solidFill>
-                  <a:schemeClr val="bg2">
-                    <a:lumMod val="60000"/>
-                    <a:lumOff val="40000"/>
-                  </a:schemeClr>
-                </a:solidFill>
-              </a:defRPr>
-            </a:lvl1pPr>
-          </a:lstStyle>
+          <a:lstStyle/>
           <a:p>
             <a:fld id="{C1FF6DA9-008F-8B48-92A6-B652298478BF}" type="slidenum">
               <a:rPr lang="en-US" smtClean="0"/>
@@ -759,15 +756,53 @@
           </a:p>
         </p:txBody>
       </p:sp>
+      <p:cxnSp>
+        <p:nvCxnSpPr>
+          <p:cNvPr id="9" name="Straight Connector 8"/>
+          <p:cNvCxnSpPr/>
+          <p:nvPr/>
+        </p:nvCxnSpPr>
+        <p:spPr>
+          <a:xfrm>
+            <a:off x="905744" y="4343400"/>
+            <a:ext cx="7406640" cy="0"/>
+          </a:xfrm>
+          <a:prstGeom prst="line">
+            <a:avLst/>
+          </a:prstGeom>
+          <a:ln w="6350">
+            <a:solidFill>
+              <a:schemeClr val="tx1">
+                <a:lumMod val="50000"/>
+                <a:lumOff val="50000"/>
+              </a:schemeClr>
+            </a:solidFill>
+          </a:ln>
+        </p:spPr>
+        <p:style>
+          <a:lnRef idx="1">
+            <a:schemeClr val="accent1"/>
+          </a:lnRef>
+          <a:fillRef idx="0">
+            <a:schemeClr val="accent1"/>
+          </a:fillRef>
+          <a:effectRef idx="0">
+            <a:schemeClr val="accent1"/>
+          </a:effectRef>
+          <a:fontRef idx="minor">
+            <a:schemeClr val="tx1"/>
+          </a:fontRef>
+        </p:style>
+      </p:cxnSp>
     </p:spTree>
     <p:extLst>
       <p:ext uri="{BB962C8B-B14F-4D97-AF65-F5344CB8AC3E}">
-        <p14:creationId xmlns:p14="http://schemas.microsoft.com/office/powerpoint/2010/main" val="2485268236"/>
+        <p14:creationId xmlns:p14="http://schemas.microsoft.com/office/powerpoint/2010/main" val="74134591"/>
       </p:ext>
     </p:extLst>
   </p:cSld>
   <p:clrMapOvr>
-    <a:overrideClrMapping bg1="dk1" tx1="lt1" bg2="dk2" tx2="lt2" accent1="accent1" accent2="accent2" accent3="accent3" accent4="accent4" accent5="accent5" accent6="accent6" hlink="hlink" folHlink="folHlink"/>
+    <a:masterClrMapping/>
   </p:clrMapOvr>
 </p:sldLayout>
 </file>
@@ -824,7 +859,7 @@
         </p:nvSpPr>
         <p:spPr/>
         <p:txBody>
-          <a:bodyPr vert="eaVert"/>
+          <a:bodyPr vert="eaVert" lIns="45720" tIns="0" rIns="45720" bIns="0"/>
           <a:lstStyle/>
           <a:p>
             <a:pPr lvl="0"/>
@@ -881,7 +916,7 @@
           <a:p>
             <a:fld id="{5BCAD085-E8A6-8845-BD4E-CB4CCA059FC4}" type="datetimeFigureOut">
               <a:rPr lang="en-US" smtClean="0"/>
-              <a:t>11/4/2023</a:t>
+              <a:t>11/5/2023</a:t>
             </a:fld>
             <a:endParaRPr lang="en-US"/>
           </a:p>
@@ -932,7 +967,7 @@
     </p:spTree>
     <p:extLst>
       <p:ext uri="{BB962C8B-B14F-4D97-AF65-F5344CB8AC3E}">
-        <p14:creationId xmlns:p14="http://schemas.microsoft.com/office/powerpoint/2010/main" val="3606992925"/>
+        <p14:creationId xmlns:p14="http://schemas.microsoft.com/office/powerpoint/2010/main" val="1664139255"/>
       </p:ext>
     </p:extLst>
   </p:cSld>
@@ -943,7 +978,7 @@
 </file>
 
 <file path=ppt/slideLayouts/slideLayout11.xml><?xml version="1.0" encoding="utf-8"?>
-<p:sldLayout xmlns:a="http://schemas.openxmlformats.org/drawingml/2006/main" xmlns:r="http://schemas.openxmlformats.org/officeDocument/2006/relationships" xmlns:p="http://schemas.openxmlformats.org/presentationml/2006/main" type="vertTitleAndTx" preserve="1">
+<p:sldLayout xmlns:a="http://schemas.openxmlformats.org/drawingml/2006/main" xmlns:r="http://schemas.openxmlformats.org/officeDocument/2006/relationships" xmlns:p="http://schemas.openxmlformats.org/presentationml/2006/main" showMasterSp="0" type="vertTitleAndTx" preserve="1">
   <p:cSld name="Vertical Title and Text">
     <p:spTree>
       <p:nvGrpSpPr>
@@ -961,588 +996,52 @@
       </p:grpSpPr>
       <p:sp>
         <p:nvSpPr>
-          <p:cNvPr id="2" name="Vertical Title 1"/>
-          <p:cNvSpPr>
-            <a:spLocks noGrp="1"/>
-          </p:cNvSpPr>
-          <p:nvPr>
-            <p:ph type="title" orient="vert"/>
-          </p:nvPr>
-        </p:nvSpPr>
-        <p:spPr>
-          <a:xfrm>
-            <a:off x="6486525" y="381000"/>
-            <a:ext cx="1857375" cy="5897562"/>
-          </a:xfrm>
-        </p:spPr>
-        <p:txBody>
-          <a:bodyPr vert="eaVert"/>
-          <a:lstStyle/>
-          <a:p>
-            <a:r>
-              <a:rPr lang="en-US"/>
-              <a:t>Click to edit Master title style</a:t>
-            </a:r>
-            <a:endParaRPr lang="en-US" dirty="0"/>
-          </a:p>
-        </p:txBody>
-      </p:sp>
-      <p:sp>
-        <p:nvSpPr>
-          <p:cNvPr id="3" name="Vertical Text Placeholder 2"/>
-          <p:cNvSpPr>
-            <a:spLocks noGrp="1"/>
-          </p:cNvSpPr>
-          <p:nvPr>
-            <p:ph type="body" orient="vert" idx="1"/>
-          </p:nvPr>
-        </p:nvSpPr>
-        <p:spPr>
-          <a:xfrm>
-            <a:off x="571500" y="381000"/>
-            <a:ext cx="5800725" cy="5897562"/>
-          </a:xfrm>
-        </p:spPr>
-        <p:txBody>
-          <a:bodyPr vert="eaVert"/>
-          <a:lstStyle/>
-          <a:p>
-            <a:pPr lvl="0"/>
-            <a:r>
-              <a:rPr lang="en-US"/>
-              <a:t>Click to edit Master text styles</a:t>
-            </a:r>
-          </a:p>
-          <a:p>
-            <a:pPr lvl="1"/>
-            <a:r>
-              <a:rPr lang="en-US"/>
-              <a:t>Second level</a:t>
-            </a:r>
-          </a:p>
-          <a:p>
-            <a:pPr lvl="2"/>
-            <a:r>
-              <a:rPr lang="en-US"/>
-              <a:t>Third level</a:t>
-            </a:r>
-          </a:p>
-          <a:p>
-            <a:pPr lvl="3"/>
-            <a:r>
-              <a:rPr lang="en-US"/>
-              <a:t>Fourth level</a:t>
-            </a:r>
-          </a:p>
-          <a:p>
-            <a:pPr lvl="4"/>
-            <a:r>
-              <a:rPr lang="en-US"/>
-              <a:t>Fifth level</a:t>
-            </a:r>
-            <a:endParaRPr lang="en-US" dirty="0"/>
-          </a:p>
-        </p:txBody>
-      </p:sp>
-      <p:sp>
-        <p:nvSpPr>
-          <p:cNvPr id="4" name="Date Placeholder 3"/>
-          <p:cNvSpPr>
-            <a:spLocks noGrp="1"/>
-          </p:cNvSpPr>
-          <p:nvPr>
-            <p:ph type="dt" sz="half" idx="10"/>
-          </p:nvPr>
-        </p:nvSpPr>
-        <p:spPr/>
-        <p:txBody>
-          <a:bodyPr/>
-          <a:lstStyle/>
-          <a:p>
-            <a:fld id="{5BCAD085-E8A6-8845-BD4E-CB4CCA059FC4}" type="datetimeFigureOut">
-              <a:rPr lang="en-US" smtClean="0"/>
-              <a:t>11/4/2023</a:t>
-            </a:fld>
-            <a:endParaRPr lang="en-US"/>
-          </a:p>
-        </p:txBody>
-      </p:sp>
-      <p:sp>
-        <p:nvSpPr>
-          <p:cNvPr id="5" name="Footer Placeholder 4"/>
-          <p:cNvSpPr>
-            <a:spLocks noGrp="1"/>
-          </p:cNvSpPr>
-          <p:nvPr>
-            <p:ph type="ftr" sz="quarter" idx="11"/>
-          </p:nvPr>
-        </p:nvSpPr>
-        <p:spPr/>
-        <p:txBody>
-          <a:bodyPr/>
-          <a:lstStyle/>
-          <a:p>
-            <a:endParaRPr lang="en-US"/>
-          </a:p>
-        </p:txBody>
-      </p:sp>
-      <p:sp>
-        <p:nvSpPr>
-          <p:cNvPr id="6" name="Slide Number Placeholder 5"/>
-          <p:cNvSpPr>
-            <a:spLocks noGrp="1"/>
-          </p:cNvSpPr>
-          <p:nvPr>
-            <p:ph type="sldNum" sz="quarter" idx="12"/>
-          </p:nvPr>
-        </p:nvSpPr>
-        <p:spPr/>
-        <p:txBody>
-          <a:bodyPr/>
-          <a:lstStyle/>
-          <a:p>
-            <a:fld id="{C1FF6DA9-008F-8B48-92A6-B652298478BF}" type="slidenum">
-              <a:rPr lang="en-US" smtClean="0"/>
-              <a:t>‹#›</a:t>
-            </a:fld>
-            <a:endParaRPr lang="en-US"/>
-          </a:p>
-        </p:txBody>
-      </p:sp>
-    </p:spTree>
-    <p:extLst>
-      <p:ext uri="{BB962C8B-B14F-4D97-AF65-F5344CB8AC3E}">
-        <p14:creationId xmlns:p14="http://schemas.microsoft.com/office/powerpoint/2010/main" val="439035223"/>
-      </p:ext>
-    </p:extLst>
-  </p:cSld>
-  <p:clrMapOvr>
-    <a:masterClrMapping/>
-  </p:clrMapOvr>
-</p:sldLayout>
-</file>
-
-<file path=ppt/slideLayouts/slideLayout2.xml><?xml version="1.0" encoding="utf-8"?>
-<p:sldLayout xmlns:a="http://schemas.openxmlformats.org/drawingml/2006/main" xmlns:r="http://schemas.openxmlformats.org/officeDocument/2006/relationships" xmlns:p="http://schemas.openxmlformats.org/presentationml/2006/main" type="obj" preserve="1">
-  <p:cSld name="Title and Content">
-    <p:spTree>
-      <p:nvGrpSpPr>
-        <p:cNvPr id="1" name=""/>
-        <p:cNvGrpSpPr/>
-        <p:nvPr/>
-      </p:nvGrpSpPr>
-      <p:grpSpPr>
-        <a:xfrm>
-          <a:off x="0" y="0"/>
-          <a:ext cx="0" cy="0"/>
-          <a:chOff x="0" y="0"/>
-          <a:chExt cx="0" cy="0"/>
-        </a:xfrm>
-      </p:grpSpPr>
-      <p:sp>
-        <p:nvSpPr>
-          <p:cNvPr id="2" name="Title 1"/>
-          <p:cNvSpPr>
-            <a:spLocks noGrp="1"/>
-          </p:cNvSpPr>
-          <p:nvPr>
-            <p:ph type="title"/>
-          </p:nvPr>
-        </p:nvSpPr>
-        <p:spPr/>
-        <p:txBody>
-          <a:bodyPr/>
-          <a:lstStyle/>
-          <a:p>
-            <a:r>
-              <a:rPr lang="en-US"/>
-              <a:t>Click to edit Master title style</a:t>
-            </a:r>
-            <a:endParaRPr lang="en-US" dirty="0"/>
-          </a:p>
-        </p:txBody>
-      </p:sp>
-      <p:sp>
-        <p:nvSpPr>
-          <p:cNvPr id="3" name="Content Placeholder 2"/>
-          <p:cNvSpPr>
-            <a:spLocks noGrp="1"/>
-          </p:cNvSpPr>
-          <p:nvPr>
-            <p:ph idx="1"/>
-          </p:nvPr>
-        </p:nvSpPr>
-        <p:spPr/>
-        <p:txBody>
-          <a:bodyPr/>
-          <a:lstStyle/>
-          <a:p>
-            <a:pPr lvl="0"/>
-            <a:r>
-              <a:rPr lang="en-US"/>
-              <a:t>Click to edit Master text styles</a:t>
-            </a:r>
-          </a:p>
-          <a:p>
-            <a:pPr lvl="1"/>
-            <a:r>
-              <a:rPr lang="en-US"/>
-              <a:t>Second level</a:t>
-            </a:r>
-          </a:p>
-          <a:p>
-            <a:pPr lvl="2"/>
-            <a:r>
-              <a:rPr lang="en-US"/>
-              <a:t>Third level</a:t>
-            </a:r>
-          </a:p>
-          <a:p>
-            <a:pPr lvl="3"/>
-            <a:r>
-              <a:rPr lang="en-US"/>
-              <a:t>Fourth level</a:t>
-            </a:r>
-          </a:p>
-          <a:p>
-            <a:pPr lvl="4"/>
-            <a:r>
-              <a:rPr lang="en-US"/>
-              <a:t>Fifth level</a:t>
-            </a:r>
-            <a:endParaRPr lang="en-US" dirty="0"/>
-          </a:p>
-        </p:txBody>
-      </p:sp>
-      <p:sp>
-        <p:nvSpPr>
-          <p:cNvPr id="4" name="Date Placeholder 3"/>
-          <p:cNvSpPr>
-            <a:spLocks noGrp="1"/>
-          </p:cNvSpPr>
-          <p:nvPr>
-            <p:ph type="dt" sz="half" idx="10"/>
-          </p:nvPr>
-        </p:nvSpPr>
-        <p:spPr/>
-        <p:txBody>
-          <a:bodyPr/>
-          <a:lstStyle/>
-          <a:p>
-            <a:fld id="{5BCAD085-E8A6-8845-BD4E-CB4CCA059FC4}" type="datetimeFigureOut">
-              <a:rPr lang="en-US" smtClean="0"/>
-              <a:t>11/4/2023</a:t>
-            </a:fld>
-            <a:endParaRPr lang="en-US"/>
-          </a:p>
-        </p:txBody>
-      </p:sp>
-      <p:sp>
-        <p:nvSpPr>
-          <p:cNvPr id="5" name="Footer Placeholder 4"/>
-          <p:cNvSpPr>
-            <a:spLocks noGrp="1"/>
-          </p:cNvSpPr>
-          <p:nvPr>
-            <p:ph type="ftr" sz="quarter" idx="11"/>
-          </p:nvPr>
-        </p:nvSpPr>
-        <p:spPr/>
-        <p:txBody>
-          <a:bodyPr/>
-          <a:lstStyle/>
-          <a:p>
-            <a:endParaRPr lang="en-US"/>
-          </a:p>
-        </p:txBody>
-      </p:sp>
-      <p:sp>
-        <p:nvSpPr>
-          <p:cNvPr id="6" name="Slide Number Placeholder 5"/>
-          <p:cNvSpPr>
-            <a:spLocks noGrp="1"/>
-          </p:cNvSpPr>
-          <p:nvPr>
-            <p:ph type="sldNum" sz="quarter" idx="12"/>
-          </p:nvPr>
-        </p:nvSpPr>
-        <p:spPr/>
-        <p:txBody>
-          <a:bodyPr/>
-          <a:lstStyle/>
-          <a:p>
-            <a:fld id="{C1FF6DA9-008F-8B48-92A6-B652298478BF}" type="slidenum">
-              <a:rPr lang="en-US" smtClean="0"/>
-              <a:t>‹#›</a:t>
-            </a:fld>
-            <a:endParaRPr lang="en-US"/>
-          </a:p>
-        </p:txBody>
-      </p:sp>
-    </p:spTree>
-    <p:extLst>
-      <p:ext uri="{BB962C8B-B14F-4D97-AF65-F5344CB8AC3E}">
-        <p14:creationId xmlns:p14="http://schemas.microsoft.com/office/powerpoint/2010/main" val="2305203422"/>
-      </p:ext>
-    </p:extLst>
-  </p:cSld>
-  <p:clrMapOvr>
-    <a:masterClrMapping/>
-  </p:clrMapOvr>
-</p:sldLayout>
-</file>
-
-<file path=ppt/slideLayouts/slideLayout3.xml><?xml version="1.0" encoding="utf-8"?>
-<p:sldLayout xmlns:a="http://schemas.openxmlformats.org/drawingml/2006/main" xmlns:r="http://schemas.openxmlformats.org/officeDocument/2006/relationships" xmlns:p="http://schemas.openxmlformats.org/presentationml/2006/main" type="secHead" preserve="1">
-  <p:cSld name="Section Header">
-    <p:spTree>
-      <p:nvGrpSpPr>
-        <p:cNvPr id="1" name=""/>
-        <p:cNvGrpSpPr/>
-        <p:nvPr/>
-      </p:nvGrpSpPr>
-      <p:grpSpPr>
-        <a:xfrm>
-          <a:off x="0" y="0"/>
-          <a:ext cx="0" cy="0"/>
-          <a:chOff x="0" y="0"/>
-          <a:chExt cx="0" cy="0"/>
-        </a:xfrm>
-      </p:grpSpPr>
-      <p:sp>
-        <p:nvSpPr>
-          <p:cNvPr id="2" name="Title 1"/>
-          <p:cNvSpPr>
-            <a:spLocks noGrp="1"/>
-          </p:cNvSpPr>
-          <p:nvPr>
-            <p:ph type="title"/>
-          </p:nvPr>
-        </p:nvSpPr>
-        <p:spPr>
-          <a:xfrm>
-            <a:off x="946404" y="758952"/>
-            <a:ext cx="7063740" cy="4041648"/>
-          </a:xfrm>
-        </p:spPr>
-        <p:txBody>
-          <a:bodyPr anchor="b">
-            <a:normAutofit/>
-          </a:bodyPr>
-          <a:lstStyle>
-            <a:lvl1pPr>
-              <a:lnSpc>
-                <a:spcPct val="85000"/>
-              </a:lnSpc>
-              <a:defRPr sz="6600" b="0"/>
-            </a:lvl1pPr>
-          </a:lstStyle>
-          <a:p>
-            <a:r>
-              <a:rPr lang="en-US"/>
-              <a:t>Click to edit Master title style</a:t>
-            </a:r>
-            <a:endParaRPr lang="en-US" dirty="0"/>
-          </a:p>
-        </p:txBody>
-      </p:sp>
-      <p:sp>
-        <p:nvSpPr>
-          <p:cNvPr id="3" name="Text Placeholder 2"/>
-          <p:cNvSpPr>
-            <a:spLocks noGrp="1"/>
-          </p:cNvSpPr>
-          <p:nvPr>
-            <p:ph type="body" idx="1"/>
-          </p:nvPr>
-        </p:nvSpPr>
-        <p:spPr>
-          <a:xfrm>
-            <a:off x="946404" y="4800600"/>
-            <a:ext cx="7063740" cy="1691640"/>
-          </a:xfrm>
-        </p:spPr>
-        <p:txBody>
-          <a:bodyPr anchor="t">
-            <a:normAutofit/>
-          </a:bodyPr>
-          <a:lstStyle>
-            <a:lvl1pPr marL="0" indent="0">
-              <a:buNone/>
-              <a:defRPr sz="2000">
-                <a:solidFill>
-                  <a:schemeClr val="tx1">
-                    <a:lumMod val="75000"/>
-                    <a:lumOff val="25000"/>
-                  </a:schemeClr>
-                </a:solidFill>
-              </a:defRPr>
-            </a:lvl1pPr>
-            <a:lvl2pPr marL="457200" indent="0">
-              <a:buNone/>
-              <a:defRPr sz="1800">
-                <a:solidFill>
-                  <a:schemeClr val="tx1">
-                    <a:tint val="75000"/>
-                  </a:schemeClr>
-                </a:solidFill>
-              </a:defRPr>
-            </a:lvl2pPr>
-            <a:lvl3pPr marL="914400" indent="0">
-              <a:buNone/>
-              <a:defRPr sz="1600">
-                <a:solidFill>
-                  <a:schemeClr val="tx1">
-                    <a:tint val="75000"/>
-                  </a:schemeClr>
-                </a:solidFill>
-              </a:defRPr>
-            </a:lvl3pPr>
-            <a:lvl4pPr marL="1371600" indent="0">
-              <a:buNone/>
-              <a:defRPr sz="1400">
-                <a:solidFill>
-                  <a:schemeClr val="tx1">
-                    <a:tint val="75000"/>
-                  </a:schemeClr>
-                </a:solidFill>
-              </a:defRPr>
-            </a:lvl4pPr>
-            <a:lvl5pPr marL="1828800" indent="0">
-              <a:buNone/>
-              <a:defRPr sz="1400">
-                <a:solidFill>
-                  <a:schemeClr val="tx1">
-                    <a:tint val="75000"/>
-                  </a:schemeClr>
-                </a:solidFill>
-              </a:defRPr>
-            </a:lvl5pPr>
-            <a:lvl6pPr marL="2286000" indent="0">
-              <a:buNone/>
-              <a:defRPr sz="1400">
-                <a:solidFill>
-                  <a:schemeClr val="tx1">
-                    <a:tint val="75000"/>
-                  </a:schemeClr>
-                </a:solidFill>
-              </a:defRPr>
-            </a:lvl6pPr>
-            <a:lvl7pPr marL="2743200" indent="0">
-              <a:buNone/>
-              <a:defRPr sz="1400">
-                <a:solidFill>
-                  <a:schemeClr val="tx1">
-                    <a:tint val="75000"/>
-                  </a:schemeClr>
-                </a:solidFill>
-              </a:defRPr>
-            </a:lvl7pPr>
-            <a:lvl8pPr marL="3200400" indent="0">
-              <a:buNone/>
-              <a:defRPr sz="1400">
-                <a:solidFill>
-                  <a:schemeClr val="tx1">
-                    <a:tint val="75000"/>
-                  </a:schemeClr>
-                </a:solidFill>
-              </a:defRPr>
-            </a:lvl8pPr>
-            <a:lvl9pPr marL="3657600" indent="0">
-              <a:buNone/>
-              <a:defRPr sz="1400">
-                <a:solidFill>
-                  <a:schemeClr val="tx1">
-                    <a:tint val="75000"/>
-                  </a:schemeClr>
-                </a:solidFill>
-              </a:defRPr>
-            </a:lvl9pPr>
-          </a:lstStyle>
-          <a:p>
-            <a:pPr lvl="0"/>
-            <a:r>
-              <a:rPr lang="en-US"/>
-              <a:t>Click to edit Master text styles</a:t>
-            </a:r>
-          </a:p>
-        </p:txBody>
-      </p:sp>
-      <p:sp>
-        <p:nvSpPr>
-          <p:cNvPr id="4" name="Date Placeholder 3"/>
-          <p:cNvSpPr>
-            <a:spLocks noGrp="1"/>
-          </p:cNvSpPr>
-          <p:nvPr>
-            <p:ph type="dt" sz="half" idx="10"/>
-          </p:nvPr>
-        </p:nvSpPr>
-        <p:spPr/>
-        <p:txBody>
-          <a:bodyPr/>
-          <a:lstStyle/>
-          <a:p>
-            <a:fld id="{5BCAD085-E8A6-8845-BD4E-CB4CCA059FC4}" type="datetimeFigureOut">
-              <a:rPr lang="en-US" smtClean="0"/>
-              <a:t>11/4/2023</a:t>
-            </a:fld>
-            <a:endParaRPr lang="en-US"/>
-          </a:p>
-        </p:txBody>
-      </p:sp>
-      <p:sp>
-        <p:nvSpPr>
-          <p:cNvPr id="5" name="Footer Placeholder 4"/>
-          <p:cNvSpPr>
-            <a:spLocks noGrp="1"/>
-          </p:cNvSpPr>
-          <p:nvPr>
-            <p:ph type="ftr" sz="quarter" idx="11"/>
-          </p:nvPr>
-        </p:nvSpPr>
-        <p:spPr/>
-        <p:txBody>
-          <a:bodyPr/>
-          <a:lstStyle/>
-          <a:p>
-            <a:endParaRPr lang="en-US"/>
-          </a:p>
-        </p:txBody>
-      </p:sp>
-      <p:sp>
-        <p:nvSpPr>
-          <p:cNvPr id="6" name="Slide Number Placeholder 5"/>
-          <p:cNvSpPr>
-            <a:spLocks noGrp="1"/>
-          </p:cNvSpPr>
-          <p:nvPr>
-            <p:ph type="sldNum" sz="quarter" idx="12"/>
-          </p:nvPr>
-        </p:nvSpPr>
-        <p:spPr/>
-        <p:txBody>
-          <a:bodyPr/>
-          <a:lstStyle/>
-          <a:p>
-            <a:fld id="{C1FF6DA9-008F-8B48-92A6-B652298478BF}" type="slidenum">
-              <a:rPr lang="en-US" smtClean="0"/>
-              <a:t>‹#›</a:t>
-            </a:fld>
-            <a:endParaRPr lang="en-US"/>
-          </a:p>
-        </p:txBody>
-      </p:sp>
-      <p:sp>
-        <p:nvSpPr>
           <p:cNvPr id="7" name="Rectangle 6"/>
           <p:cNvSpPr/>
           <p:nvPr/>
         </p:nvSpPr>
         <p:spPr>
           <a:xfrm>
-            <a:off x="0" y="0"/>
-            <a:ext cx="342900" cy="6858000"/>
+            <a:off x="2382" y="6400800"/>
+            <a:ext cx="9141619" cy="457200"/>
+          </a:xfrm>
+          <a:prstGeom prst="rect">
+            <a:avLst/>
+          </a:prstGeom>
+          <a:solidFill>
+            <a:schemeClr val="accent2"/>
+          </a:solidFill>
+          <a:ln>
+            <a:noFill/>
+          </a:ln>
+        </p:spPr>
+        <p:style>
+          <a:lnRef idx="2">
+            <a:schemeClr val="accent1">
+              <a:shade val="50000"/>
+            </a:schemeClr>
+          </a:lnRef>
+          <a:fillRef idx="1">
+            <a:schemeClr val="accent1"/>
+          </a:fillRef>
+          <a:effectRef idx="0">
+            <a:schemeClr val="accent1"/>
+          </a:effectRef>
+          <a:fontRef idx="minor">
+            <a:schemeClr val="lt1"/>
+          </a:fontRef>
+        </p:style>
+      </p:sp>
+      <p:sp>
+        <p:nvSpPr>
+          <p:cNvPr id="8" name="Rectangle 7"/>
+          <p:cNvSpPr/>
+          <p:nvPr/>
+        </p:nvSpPr>
+        <p:spPr>
+          <a:xfrm>
+            <a:off x="12" y="6334316"/>
+            <a:ext cx="9141619" cy="64008"/>
           </a:xfrm>
           <a:prstGeom prst="rect">
             <a:avLst/>
@@ -1571,10 +1070,711 @@
           </a:fontRef>
         </p:style>
       </p:sp>
+      <p:sp>
+        <p:nvSpPr>
+          <p:cNvPr id="2" name="Vertical Title 1"/>
+          <p:cNvSpPr>
+            <a:spLocks noGrp="1"/>
+          </p:cNvSpPr>
+          <p:nvPr>
+            <p:ph type="title" orient="vert"/>
+          </p:nvPr>
+        </p:nvSpPr>
+        <p:spPr>
+          <a:xfrm>
+            <a:off x="6543675" y="414779"/>
+            <a:ext cx="1971675" cy="5757421"/>
+          </a:xfrm>
+        </p:spPr>
+        <p:txBody>
+          <a:bodyPr vert="eaVert"/>
+          <a:lstStyle/>
+          <a:p>
+            <a:r>
+              <a:rPr lang="en-US"/>
+              <a:t>Click to edit Master title style</a:t>
+            </a:r>
+            <a:endParaRPr lang="en-US" dirty="0"/>
+          </a:p>
+        </p:txBody>
+      </p:sp>
+      <p:sp>
+        <p:nvSpPr>
+          <p:cNvPr id="3" name="Vertical Text Placeholder 2"/>
+          <p:cNvSpPr>
+            <a:spLocks noGrp="1"/>
+          </p:cNvSpPr>
+          <p:nvPr>
+            <p:ph type="body" orient="vert" idx="1"/>
+          </p:nvPr>
+        </p:nvSpPr>
+        <p:spPr>
+          <a:xfrm>
+            <a:off x="628650" y="414779"/>
+            <a:ext cx="5800725" cy="5757420"/>
+          </a:xfrm>
+        </p:spPr>
+        <p:txBody>
+          <a:bodyPr vert="eaVert" lIns="45720" tIns="0" rIns="45720" bIns="0"/>
+          <a:lstStyle/>
+          <a:p>
+            <a:pPr lvl="0"/>
+            <a:r>
+              <a:rPr lang="en-US"/>
+              <a:t>Click to edit Master text styles</a:t>
+            </a:r>
+          </a:p>
+          <a:p>
+            <a:pPr lvl="1"/>
+            <a:r>
+              <a:rPr lang="en-US"/>
+              <a:t>Second level</a:t>
+            </a:r>
+          </a:p>
+          <a:p>
+            <a:pPr lvl="2"/>
+            <a:r>
+              <a:rPr lang="en-US"/>
+              <a:t>Third level</a:t>
+            </a:r>
+          </a:p>
+          <a:p>
+            <a:pPr lvl="3"/>
+            <a:r>
+              <a:rPr lang="en-US"/>
+              <a:t>Fourth level</a:t>
+            </a:r>
+          </a:p>
+          <a:p>
+            <a:pPr lvl="4"/>
+            <a:r>
+              <a:rPr lang="en-US"/>
+              <a:t>Fifth level</a:t>
+            </a:r>
+            <a:endParaRPr lang="en-US" dirty="0"/>
+          </a:p>
+        </p:txBody>
+      </p:sp>
+      <p:sp>
+        <p:nvSpPr>
+          <p:cNvPr id="4" name="Date Placeholder 3"/>
+          <p:cNvSpPr>
+            <a:spLocks noGrp="1"/>
+          </p:cNvSpPr>
+          <p:nvPr>
+            <p:ph type="dt" sz="half" idx="10"/>
+          </p:nvPr>
+        </p:nvSpPr>
+        <p:spPr/>
+        <p:txBody>
+          <a:bodyPr/>
+          <a:lstStyle/>
+          <a:p>
+            <a:fld id="{5BCAD085-E8A6-8845-BD4E-CB4CCA059FC4}" type="datetimeFigureOut">
+              <a:rPr lang="en-US" smtClean="0"/>
+              <a:t>11/5/2023</a:t>
+            </a:fld>
+            <a:endParaRPr lang="en-US"/>
+          </a:p>
+        </p:txBody>
+      </p:sp>
+      <p:sp>
+        <p:nvSpPr>
+          <p:cNvPr id="5" name="Footer Placeholder 4"/>
+          <p:cNvSpPr>
+            <a:spLocks noGrp="1"/>
+          </p:cNvSpPr>
+          <p:nvPr>
+            <p:ph type="ftr" sz="quarter" idx="11"/>
+          </p:nvPr>
+        </p:nvSpPr>
+        <p:spPr/>
+        <p:txBody>
+          <a:bodyPr/>
+          <a:lstStyle/>
+          <a:p>
+            <a:endParaRPr lang="en-US"/>
+          </a:p>
+        </p:txBody>
+      </p:sp>
+      <p:sp>
+        <p:nvSpPr>
+          <p:cNvPr id="6" name="Slide Number Placeholder 5"/>
+          <p:cNvSpPr>
+            <a:spLocks noGrp="1"/>
+          </p:cNvSpPr>
+          <p:nvPr>
+            <p:ph type="sldNum" sz="quarter" idx="12"/>
+          </p:nvPr>
+        </p:nvSpPr>
+        <p:spPr/>
+        <p:txBody>
+          <a:bodyPr/>
+          <a:lstStyle/>
+          <a:p>
+            <a:fld id="{C1FF6DA9-008F-8B48-92A6-B652298478BF}" type="slidenum">
+              <a:rPr lang="en-US" smtClean="0"/>
+              <a:t>‹#›</a:t>
+            </a:fld>
+            <a:endParaRPr lang="en-US"/>
+          </a:p>
+        </p:txBody>
+      </p:sp>
     </p:spTree>
     <p:extLst>
       <p:ext uri="{BB962C8B-B14F-4D97-AF65-F5344CB8AC3E}">
-        <p14:creationId xmlns:p14="http://schemas.microsoft.com/office/powerpoint/2010/main" val="3857228812"/>
+        <p14:creationId xmlns:p14="http://schemas.microsoft.com/office/powerpoint/2010/main" val="4023500854"/>
+      </p:ext>
+    </p:extLst>
+  </p:cSld>
+  <p:clrMapOvr>
+    <a:masterClrMapping/>
+  </p:clrMapOvr>
+</p:sldLayout>
+</file>
+
+<file path=ppt/slideLayouts/slideLayout2.xml><?xml version="1.0" encoding="utf-8"?>
+<p:sldLayout xmlns:a="http://schemas.openxmlformats.org/drawingml/2006/main" xmlns:r="http://schemas.openxmlformats.org/officeDocument/2006/relationships" xmlns:p="http://schemas.openxmlformats.org/presentationml/2006/main" type="obj" preserve="1">
+  <p:cSld name="Title and Content">
+    <p:spTree>
+      <p:nvGrpSpPr>
+        <p:cNvPr id="1" name=""/>
+        <p:cNvGrpSpPr/>
+        <p:nvPr/>
+      </p:nvGrpSpPr>
+      <p:grpSpPr>
+        <a:xfrm>
+          <a:off x="0" y="0"/>
+          <a:ext cx="0" cy="0"/>
+          <a:chOff x="0" y="0"/>
+          <a:chExt cx="0" cy="0"/>
+        </a:xfrm>
+      </p:grpSpPr>
+      <p:sp>
+        <p:nvSpPr>
+          <p:cNvPr id="2" name="Title 1"/>
+          <p:cNvSpPr>
+            <a:spLocks noGrp="1"/>
+          </p:cNvSpPr>
+          <p:nvPr>
+            <p:ph type="title"/>
+          </p:nvPr>
+        </p:nvSpPr>
+        <p:spPr/>
+        <p:txBody>
+          <a:bodyPr/>
+          <a:lstStyle/>
+          <a:p>
+            <a:r>
+              <a:rPr lang="en-US"/>
+              <a:t>Click to edit Master title style</a:t>
+            </a:r>
+            <a:endParaRPr lang="en-US" dirty="0"/>
+          </a:p>
+        </p:txBody>
+      </p:sp>
+      <p:sp>
+        <p:nvSpPr>
+          <p:cNvPr id="3" name="Content Placeholder 2"/>
+          <p:cNvSpPr>
+            <a:spLocks noGrp="1"/>
+          </p:cNvSpPr>
+          <p:nvPr>
+            <p:ph idx="1"/>
+          </p:nvPr>
+        </p:nvSpPr>
+        <p:spPr/>
+        <p:txBody>
+          <a:bodyPr/>
+          <a:lstStyle/>
+          <a:p>
+            <a:pPr lvl="0"/>
+            <a:r>
+              <a:rPr lang="en-US"/>
+              <a:t>Click to edit Master text styles</a:t>
+            </a:r>
+          </a:p>
+          <a:p>
+            <a:pPr lvl="1"/>
+            <a:r>
+              <a:rPr lang="en-US"/>
+              <a:t>Second level</a:t>
+            </a:r>
+          </a:p>
+          <a:p>
+            <a:pPr lvl="2"/>
+            <a:r>
+              <a:rPr lang="en-US"/>
+              <a:t>Third level</a:t>
+            </a:r>
+          </a:p>
+          <a:p>
+            <a:pPr lvl="3"/>
+            <a:r>
+              <a:rPr lang="en-US"/>
+              <a:t>Fourth level</a:t>
+            </a:r>
+          </a:p>
+          <a:p>
+            <a:pPr lvl="4"/>
+            <a:r>
+              <a:rPr lang="en-US"/>
+              <a:t>Fifth level</a:t>
+            </a:r>
+            <a:endParaRPr lang="en-US" dirty="0"/>
+          </a:p>
+        </p:txBody>
+      </p:sp>
+      <p:sp>
+        <p:nvSpPr>
+          <p:cNvPr id="4" name="Date Placeholder 3"/>
+          <p:cNvSpPr>
+            <a:spLocks noGrp="1"/>
+          </p:cNvSpPr>
+          <p:nvPr>
+            <p:ph type="dt" sz="half" idx="10"/>
+          </p:nvPr>
+        </p:nvSpPr>
+        <p:spPr/>
+        <p:txBody>
+          <a:bodyPr/>
+          <a:lstStyle/>
+          <a:p>
+            <a:fld id="{5BCAD085-E8A6-8845-BD4E-CB4CCA059FC4}" type="datetimeFigureOut">
+              <a:rPr lang="en-US" smtClean="0"/>
+              <a:t>11/5/2023</a:t>
+            </a:fld>
+            <a:endParaRPr lang="en-US"/>
+          </a:p>
+        </p:txBody>
+      </p:sp>
+      <p:sp>
+        <p:nvSpPr>
+          <p:cNvPr id="5" name="Footer Placeholder 4"/>
+          <p:cNvSpPr>
+            <a:spLocks noGrp="1"/>
+          </p:cNvSpPr>
+          <p:nvPr>
+            <p:ph type="ftr" sz="quarter" idx="11"/>
+          </p:nvPr>
+        </p:nvSpPr>
+        <p:spPr/>
+        <p:txBody>
+          <a:bodyPr/>
+          <a:lstStyle/>
+          <a:p>
+            <a:endParaRPr lang="en-US"/>
+          </a:p>
+        </p:txBody>
+      </p:sp>
+      <p:sp>
+        <p:nvSpPr>
+          <p:cNvPr id="6" name="Slide Number Placeholder 5"/>
+          <p:cNvSpPr>
+            <a:spLocks noGrp="1"/>
+          </p:cNvSpPr>
+          <p:nvPr>
+            <p:ph type="sldNum" sz="quarter" idx="12"/>
+          </p:nvPr>
+        </p:nvSpPr>
+        <p:spPr/>
+        <p:txBody>
+          <a:bodyPr/>
+          <a:lstStyle/>
+          <a:p>
+            <a:fld id="{C1FF6DA9-008F-8B48-92A6-B652298478BF}" type="slidenum">
+              <a:rPr lang="en-US" smtClean="0"/>
+              <a:t>‹#›</a:t>
+            </a:fld>
+            <a:endParaRPr lang="en-US"/>
+          </a:p>
+        </p:txBody>
+      </p:sp>
+    </p:spTree>
+    <p:extLst>
+      <p:ext uri="{BB962C8B-B14F-4D97-AF65-F5344CB8AC3E}">
+        <p14:creationId xmlns:p14="http://schemas.microsoft.com/office/powerpoint/2010/main" val="844606389"/>
+      </p:ext>
+    </p:extLst>
+  </p:cSld>
+  <p:clrMapOvr>
+    <a:masterClrMapping/>
+  </p:clrMapOvr>
+</p:sldLayout>
+</file>
+
+<file path=ppt/slideLayouts/slideLayout3.xml><?xml version="1.0" encoding="utf-8"?>
+<p:sldLayout xmlns:a="http://schemas.openxmlformats.org/drawingml/2006/main" xmlns:r="http://schemas.openxmlformats.org/officeDocument/2006/relationships" xmlns:p="http://schemas.openxmlformats.org/presentationml/2006/main" showMasterSp="0" type="secHead" preserve="1">
+  <p:cSld name="Section Header">
+    <p:bg>
+      <p:bgPr>
+        <a:solidFill>
+          <a:schemeClr val="bg1"/>
+        </a:solidFill>
+        <a:effectLst/>
+      </p:bgPr>
+    </p:bg>
+    <p:spTree>
+      <p:nvGrpSpPr>
+        <p:cNvPr id="1" name=""/>
+        <p:cNvGrpSpPr/>
+        <p:nvPr/>
+      </p:nvGrpSpPr>
+      <p:grpSpPr>
+        <a:xfrm>
+          <a:off x="0" y="0"/>
+          <a:ext cx="0" cy="0"/>
+          <a:chOff x="0" y="0"/>
+          <a:chExt cx="0" cy="0"/>
+        </a:xfrm>
+      </p:grpSpPr>
+      <p:sp>
+        <p:nvSpPr>
+          <p:cNvPr id="7" name="Rectangle 6"/>
+          <p:cNvSpPr/>
+          <p:nvPr/>
+        </p:nvSpPr>
+        <p:spPr>
+          <a:xfrm>
+            <a:off x="2382" y="6400800"/>
+            <a:ext cx="9141619" cy="457200"/>
+          </a:xfrm>
+          <a:prstGeom prst="rect">
+            <a:avLst/>
+          </a:prstGeom>
+          <a:solidFill>
+            <a:schemeClr val="accent2"/>
+          </a:solidFill>
+          <a:ln>
+            <a:noFill/>
+          </a:ln>
+        </p:spPr>
+        <p:style>
+          <a:lnRef idx="2">
+            <a:schemeClr val="accent1">
+              <a:shade val="50000"/>
+            </a:schemeClr>
+          </a:lnRef>
+          <a:fillRef idx="1">
+            <a:schemeClr val="accent1"/>
+          </a:fillRef>
+          <a:effectRef idx="0">
+            <a:schemeClr val="accent1"/>
+          </a:effectRef>
+          <a:fontRef idx="minor">
+            <a:schemeClr val="lt1"/>
+          </a:fontRef>
+        </p:style>
+      </p:sp>
+      <p:sp>
+        <p:nvSpPr>
+          <p:cNvPr id="8" name="Rectangle 7"/>
+          <p:cNvSpPr/>
+          <p:nvPr/>
+        </p:nvSpPr>
+        <p:spPr>
+          <a:xfrm>
+            <a:off x="12" y="6334316"/>
+            <a:ext cx="9141619" cy="64008"/>
+          </a:xfrm>
+          <a:prstGeom prst="rect">
+            <a:avLst/>
+          </a:prstGeom>
+          <a:solidFill>
+            <a:schemeClr val="accent1"/>
+          </a:solidFill>
+          <a:ln>
+            <a:noFill/>
+          </a:ln>
+        </p:spPr>
+        <p:style>
+          <a:lnRef idx="2">
+            <a:schemeClr val="accent1">
+              <a:shade val="50000"/>
+            </a:schemeClr>
+          </a:lnRef>
+          <a:fillRef idx="1">
+            <a:schemeClr val="accent1"/>
+          </a:fillRef>
+          <a:effectRef idx="0">
+            <a:schemeClr val="accent1"/>
+          </a:effectRef>
+          <a:fontRef idx="minor">
+            <a:schemeClr val="lt1"/>
+          </a:fontRef>
+        </p:style>
+      </p:sp>
+      <p:sp>
+        <p:nvSpPr>
+          <p:cNvPr id="2" name="Title 1"/>
+          <p:cNvSpPr>
+            <a:spLocks noGrp="1"/>
+          </p:cNvSpPr>
+          <p:nvPr>
+            <p:ph type="title"/>
+          </p:nvPr>
+        </p:nvSpPr>
+        <p:spPr>
+          <a:xfrm>
+            <a:off x="822960" y="758952"/>
+            <a:ext cx="7543800" cy="3566160"/>
+          </a:xfrm>
+        </p:spPr>
+        <p:txBody>
+          <a:bodyPr anchor="b" anchorCtr="0">
+            <a:normAutofit/>
+          </a:bodyPr>
+          <a:lstStyle>
+            <a:lvl1pPr>
+              <a:lnSpc>
+                <a:spcPct val="85000"/>
+              </a:lnSpc>
+              <a:defRPr sz="8000" b="0">
+                <a:solidFill>
+                  <a:schemeClr val="tx1">
+                    <a:lumMod val="85000"/>
+                    <a:lumOff val="15000"/>
+                  </a:schemeClr>
+                </a:solidFill>
+              </a:defRPr>
+            </a:lvl1pPr>
+          </a:lstStyle>
+          <a:p>
+            <a:r>
+              <a:rPr lang="en-US"/>
+              <a:t>Click to edit Master title style</a:t>
+            </a:r>
+            <a:endParaRPr lang="en-US" dirty="0"/>
+          </a:p>
+        </p:txBody>
+      </p:sp>
+      <p:sp>
+        <p:nvSpPr>
+          <p:cNvPr id="3" name="Text Placeholder 2"/>
+          <p:cNvSpPr>
+            <a:spLocks noGrp="1"/>
+          </p:cNvSpPr>
+          <p:nvPr>
+            <p:ph type="body" idx="1"/>
+          </p:nvPr>
+        </p:nvSpPr>
+        <p:spPr>
+          <a:xfrm>
+            <a:off x="822960" y="4453128"/>
+            <a:ext cx="7543800" cy="1143000"/>
+          </a:xfrm>
+        </p:spPr>
+        <p:txBody>
+          <a:bodyPr lIns="91440" rIns="91440" anchor="t" anchorCtr="0">
+            <a:normAutofit/>
+          </a:bodyPr>
+          <a:lstStyle>
+            <a:lvl1pPr marL="0" indent="0">
+              <a:buNone/>
+              <a:defRPr sz="2400" cap="all" spc="200" baseline="0">
+                <a:solidFill>
+                  <a:schemeClr val="tx2"/>
+                </a:solidFill>
+                <a:latin typeface="+mj-lt"/>
+              </a:defRPr>
+            </a:lvl1pPr>
+            <a:lvl2pPr marL="457200" indent="0">
+              <a:buNone/>
+              <a:defRPr sz="1800">
+                <a:solidFill>
+                  <a:schemeClr val="tx1">
+                    <a:tint val="75000"/>
+                  </a:schemeClr>
+                </a:solidFill>
+              </a:defRPr>
+            </a:lvl2pPr>
+            <a:lvl3pPr marL="914400" indent="0">
+              <a:buNone/>
+              <a:defRPr sz="1600">
+                <a:solidFill>
+                  <a:schemeClr val="tx1">
+                    <a:tint val="75000"/>
+                  </a:schemeClr>
+                </a:solidFill>
+              </a:defRPr>
+            </a:lvl3pPr>
+            <a:lvl4pPr marL="1371600" indent="0">
+              <a:buNone/>
+              <a:defRPr sz="1400">
+                <a:solidFill>
+                  <a:schemeClr val="tx1">
+                    <a:tint val="75000"/>
+                  </a:schemeClr>
+                </a:solidFill>
+              </a:defRPr>
+            </a:lvl4pPr>
+            <a:lvl5pPr marL="1828800" indent="0">
+              <a:buNone/>
+              <a:defRPr sz="1400">
+                <a:solidFill>
+                  <a:schemeClr val="tx1">
+                    <a:tint val="75000"/>
+                  </a:schemeClr>
+                </a:solidFill>
+              </a:defRPr>
+            </a:lvl5pPr>
+            <a:lvl6pPr marL="2286000" indent="0">
+              <a:buNone/>
+              <a:defRPr sz="1400">
+                <a:solidFill>
+                  <a:schemeClr val="tx1">
+                    <a:tint val="75000"/>
+                  </a:schemeClr>
+                </a:solidFill>
+              </a:defRPr>
+            </a:lvl6pPr>
+            <a:lvl7pPr marL="2743200" indent="0">
+              <a:buNone/>
+              <a:defRPr sz="1400">
+                <a:solidFill>
+                  <a:schemeClr val="tx1">
+                    <a:tint val="75000"/>
+                  </a:schemeClr>
+                </a:solidFill>
+              </a:defRPr>
+            </a:lvl7pPr>
+            <a:lvl8pPr marL="3200400" indent="0">
+              <a:buNone/>
+              <a:defRPr sz="1400">
+                <a:solidFill>
+                  <a:schemeClr val="tx1">
+                    <a:tint val="75000"/>
+                  </a:schemeClr>
+                </a:solidFill>
+              </a:defRPr>
+            </a:lvl8pPr>
+            <a:lvl9pPr marL="3657600" indent="0">
+              <a:buNone/>
+              <a:defRPr sz="1400">
+                <a:solidFill>
+                  <a:schemeClr val="tx1">
+                    <a:tint val="75000"/>
+                  </a:schemeClr>
+                </a:solidFill>
+              </a:defRPr>
+            </a:lvl9pPr>
+          </a:lstStyle>
+          <a:p>
+            <a:pPr lvl="0"/>
+            <a:r>
+              <a:rPr lang="en-US"/>
+              <a:t>Click to edit Master text styles</a:t>
+            </a:r>
+          </a:p>
+        </p:txBody>
+      </p:sp>
+      <p:sp>
+        <p:nvSpPr>
+          <p:cNvPr id="4" name="Date Placeholder 3"/>
+          <p:cNvSpPr>
+            <a:spLocks noGrp="1"/>
+          </p:cNvSpPr>
+          <p:nvPr>
+            <p:ph type="dt" sz="half" idx="10"/>
+          </p:nvPr>
+        </p:nvSpPr>
+        <p:spPr/>
+        <p:txBody>
+          <a:bodyPr/>
+          <a:lstStyle/>
+          <a:p>
+            <a:fld id="{5BCAD085-E8A6-8845-BD4E-CB4CCA059FC4}" type="datetimeFigureOut">
+              <a:rPr lang="en-US" smtClean="0"/>
+              <a:t>11/5/2023</a:t>
+            </a:fld>
+            <a:endParaRPr lang="en-US"/>
+          </a:p>
+        </p:txBody>
+      </p:sp>
+      <p:sp>
+        <p:nvSpPr>
+          <p:cNvPr id="5" name="Footer Placeholder 4"/>
+          <p:cNvSpPr>
+            <a:spLocks noGrp="1"/>
+          </p:cNvSpPr>
+          <p:nvPr>
+            <p:ph type="ftr" sz="quarter" idx="11"/>
+          </p:nvPr>
+        </p:nvSpPr>
+        <p:spPr/>
+        <p:txBody>
+          <a:bodyPr/>
+          <a:lstStyle/>
+          <a:p>
+            <a:endParaRPr lang="en-US"/>
+          </a:p>
+        </p:txBody>
+      </p:sp>
+      <p:sp>
+        <p:nvSpPr>
+          <p:cNvPr id="6" name="Slide Number Placeholder 5"/>
+          <p:cNvSpPr>
+            <a:spLocks noGrp="1"/>
+          </p:cNvSpPr>
+          <p:nvPr>
+            <p:ph type="sldNum" sz="quarter" idx="12"/>
+          </p:nvPr>
+        </p:nvSpPr>
+        <p:spPr/>
+        <p:txBody>
+          <a:bodyPr/>
+          <a:lstStyle/>
+          <a:p>
+            <a:fld id="{C1FF6DA9-008F-8B48-92A6-B652298478BF}" type="slidenum">
+              <a:rPr lang="en-US" smtClean="0"/>
+              <a:t>‹#›</a:t>
+            </a:fld>
+            <a:endParaRPr lang="en-US"/>
+          </a:p>
+        </p:txBody>
+      </p:sp>
+      <p:cxnSp>
+        <p:nvCxnSpPr>
+          <p:cNvPr id="9" name="Straight Connector 8"/>
+          <p:cNvCxnSpPr/>
+          <p:nvPr/>
+        </p:nvCxnSpPr>
+        <p:spPr>
+          <a:xfrm>
+            <a:off x="905744" y="4343400"/>
+            <a:ext cx="7406640" cy="0"/>
+          </a:xfrm>
+          <a:prstGeom prst="line">
+            <a:avLst/>
+          </a:prstGeom>
+          <a:ln w="6350">
+            <a:solidFill>
+              <a:schemeClr val="tx1">
+                <a:lumMod val="50000"/>
+                <a:lumOff val="50000"/>
+              </a:schemeClr>
+            </a:solidFill>
+          </a:ln>
+        </p:spPr>
+        <p:style>
+          <a:lnRef idx="1">
+            <a:schemeClr val="accent1"/>
+          </a:lnRef>
+          <a:fillRef idx="0">
+            <a:schemeClr val="accent1"/>
+          </a:fillRef>
+          <a:effectRef idx="0">
+            <a:schemeClr val="accent1"/>
+          </a:effectRef>
+          <a:fontRef idx="minor">
+            <a:schemeClr val="tx1"/>
+          </a:fontRef>
+        </p:style>
+      </p:cxnSp>
+    </p:spTree>
+    <p:extLst>
+      <p:ext uri="{BB962C8B-B14F-4D97-AF65-F5344CB8AC3E}">
+        <p14:creationId xmlns:p14="http://schemas.microsoft.com/office/powerpoint/2010/main" val="1475099358"/>
       </p:ext>
     </p:extLst>
   </p:cSld>
@@ -1603,107 +1803,27 @@
       </p:grpSpPr>
       <p:sp>
         <p:nvSpPr>
-          <p:cNvPr id="2" name="Title 1"/>
+          <p:cNvPr id="8" name="Title 7"/>
           <p:cNvSpPr>
             <a:spLocks noGrp="1"/>
           </p:cNvSpPr>
           <p:nvPr>
             <p:ph type="title"/>
-          </p:nvPr>
-        </p:nvSpPr>
-        <p:spPr/>
-        <p:txBody>
-          <a:bodyPr/>
-          <a:lstStyle/>
-          <a:p>
-            <a:r>
-              <a:rPr lang="en-US"/>
-              <a:t>Click to edit Master title style</a:t>
-            </a:r>
-            <a:endParaRPr lang="en-US" dirty="0"/>
-          </a:p>
-        </p:txBody>
-      </p:sp>
-      <p:sp>
-        <p:nvSpPr>
-          <p:cNvPr id="3" name="Content Placeholder 2"/>
-          <p:cNvSpPr>
-            <a:spLocks noGrp="1"/>
-          </p:cNvSpPr>
-          <p:nvPr>
-            <p:ph sz="half" idx="1"/>
           </p:nvPr>
         </p:nvSpPr>
         <p:spPr>
           <a:xfrm>
-            <a:off x="946404" y="1828801"/>
-            <a:ext cx="3360420" cy="4351337"/>
+            <a:off x="822960" y="286604"/>
+            <a:ext cx="7543800" cy="1450757"/>
           </a:xfrm>
         </p:spPr>
         <p:txBody>
           <a:bodyPr/>
-          <a:lstStyle>
-            <a:lvl1pPr>
-              <a:defRPr sz="1800"/>
-            </a:lvl1pPr>
-            <a:lvl2pPr>
-              <a:defRPr sz="1600"/>
-            </a:lvl2pPr>
-            <a:lvl3pPr>
-              <a:defRPr sz="1400"/>
-            </a:lvl3pPr>
-            <a:lvl4pPr>
-              <a:defRPr sz="1400"/>
-            </a:lvl4pPr>
-            <a:lvl5pPr>
-              <a:defRPr sz="1400"/>
-            </a:lvl5pPr>
-            <a:lvl6pPr>
-              <a:defRPr sz="1400"/>
-            </a:lvl6pPr>
-            <a:lvl7pPr>
-              <a:defRPr sz="1400"/>
-            </a:lvl7pPr>
-            <a:lvl8pPr>
-              <a:defRPr sz="1400"/>
-            </a:lvl8pPr>
-            <a:lvl9pPr>
-              <a:defRPr sz="1400"/>
-            </a:lvl9pPr>
-          </a:lstStyle>
-          <a:p>
-            <a:pPr lvl="0"/>
-            <a:r>
-              <a:rPr lang="en-US"/>
-              <a:t>Click to edit Master text styles</a:t>
-            </a:r>
-          </a:p>
-          <a:p>
-            <a:pPr lvl="1"/>
-            <a:r>
-              <a:rPr lang="en-US"/>
-              <a:t>Second level</a:t>
-            </a:r>
-          </a:p>
-          <a:p>
-            <a:pPr lvl="2"/>
-            <a:r>
-              <a:rPr lang="en-US"/>
-              <a:t>Third level</a:t>
-            </a:r>
-          </a:p>
-          <a:p>
-            <a:pPr lvl="3"/>
-            <a:r>
-              <a:rPr lang="en-US"/>
-              <a:t>Fourth level</a:t>
-            </a:r>
-          </a:p>
-          <a:p>
-            <a:pPr lvl="4"/>
-            <a:r>
-              <a:rPr lang="en-US"/>
-              <a:t>Fifth level</a:t>
+          <a:lstStyle/>
+          <a:p>
+            <a:r>
+              <a:rPr lang="en-US"/>
+              <a:t>Click to edit Master title style</a:t>
             </a:r>
             <a:endParaRPr lang="en-US" dirty="0"/>
           </a:p>
@@ -1711,51 +1831,80 @@
       </p:sp>
       <p:sp>
         <p:nvSpPr>
-          <p:cNvPr id="4" name="Content Placeholder 3"/>
-          <p:cNvSpPr>
-            <a:spLocks noGrp="1"/>
-          </p:cNvSpPr>
-          <p:nvPr>
-            <p:ph sz="half" idx="2"/>
+          <p:cNvPr id="3" name="Content Placeholder 2"/>
+          <p:cNvSpPr>
+            <a:spLocks noGrp="1"/>
+          </p:cNvSpPr>
+          <p:nvPr>
+            <p:ph sz="half" idx="1"/>
           </p:nvPr>
         </p:nvSpPr>
         <p:spPr>
           <a:xfrm>
-            <a:off x="4594860" y="1828801"/>
-            <a:ext cx="3360420" cy="4351337"/>
+            <a:off x="822960" y="1845734"/>
+            <a:ext cx="3703320" cy="4023360"/>
           </a:xfrm>
         </p:spPr>
         <p:txBody>
           <a:bodyPr/>
-          <a:lstStyle>
-            <a:lvl1pPr>
-              <a:defRPr sz="1800"/>
-            </a:lvl1pPr>
-            <a:lvl2pPr>
-              <a:defRPr sz="1600"/>
-            </a:lvl2pPr>
-            <a:lvl3pPr>
-              <a:defRPr sz="1400"/>
-            </a:lvl3pPr>
-            <a:lvl4pPr>
-              <a:defRPr sz="1400"/>
-            </a:lvl4pPr>
-            <a:lvl5pPr>
-              <a:defRPr sz="1400"/>
-            </a:lvl5pPr>
-            <a:lvl6pPr>
-              <a:defRPr sz="1400"/>
-            </a:lvl6pPr>
-            <a:lvl7pPr>
-              <a:defRPr sz="1400"/>
-            </a:lvl7pPr>
-            <a:lvl8pPr>
-              <a:defRPr sz="1400"/>
-            </a:lvl8pPr>
-            <a:lvl9pPr>
-              <a:defRPr sz="1400"/>
-            </a:lvl9pPr>
-          </a:lstStyle>
+          <a:lstStyle/>
+          <a:p>
+            <a:pPr lvl="0"/>
+            <a:r>
+              <a:rPr lang="en-US"/>
+              <a:t>Click to edit Master text styles</a:t>
+            </a:r>
+          </a:p>
+          <a:p>
+            <a:pPr lvl="1"/>
+            <a:r>
+              <a:rPr lang="en-US"/>
+              <a:t>Second level</a:t>
+            </a:r>
+          </a:p>
+          <a:p>
+            <a:pPr lvl="2"/>
+            <a:r>
+              <a:rPr lang="en-US"/>
+              <a:t>Third level</a:t>
+            </a:r>
+          </a:p>
+          <a:p>
+            <a:pPr lvl="3"/>
+            <a:r>
+              <a:rPr lang="en-US"/>
+              <a:t>Fourth level</a:t>
+            </a:r>
+          </a:p>
+          <a:p>
+            <a:pPr lvl="4"/>
+            <a:r>
+              <a:rPr lang="en-US"/>
+              <a:t>Fifth level</a:t>
+            </a:r>
+            <a:endParaRPr lang="en-US" dirty="0"/>
+          </a:p>
+        </p:txBody>
+      </p:sp>
+      <p:sp>
+        <p:nvSpPr>
+          <p:cNvPr id="4" name="Content Placeholder 3"/>
+          <p:cNvSpPr>
+            <a:spLocks noGrp="1"/>
+          </p:cNvSpPr>
+          <p:nvPr>
+            <p:ph sz="half" idx="2"/>
+          </p:nvPr>
+        </p:nvSpPr>
+        <p:spPr>
+          <a:xfrm>
+            <a:off x="4663440" y="1845736"/>
+            <a:ext cx="3703320" cy="4023359"/>
+          </a:xfrm>
+        </p:spPr>
+        <p:txBody>
+          <a:bodyPr/>
+          <a:lstStyle/>
           <a:p>
             <a:pPr lvl="0"/>
             <a:r>
@@ -1811,7 +1960,7 @@
           <a:p>
             <a:fld id="{5BCAD085-E8A6-8845-BD4E-CB4CCA059FC4}" type="datetimeFigureOut">
               <a:rPr lang="en-US" smtClean="0"/>
-              <a:t>11/4/2023</a:t>
+              <a:t>11/5/2023</a:t>
             </a:fld>
             <a:endParaRPr lang="en-US"/>
           </a:p>
@@ -1862,7 +2011,7 @@
     </p:spTree>
     <p:extLst>
       <p:ext uri="{BB962C8B-B14F-4D97-AF65-F5344CB8AC3E}">
-        <p14:creationId xmlns:p14="http://schemas.microsoft.com/office/powerpoint/2010/main" val="84745467"/>
+        <p14:creationId xmlns:p14="http://schemas.microsoft.com/office/powerpoint/2010/main" val="2660844502"/>
       </p:ext>
     </p:extLst>
   </p:cSld>
@@ -1899,46 +2048,48 @@
             <p:ph type="title"/>
           </p:nvPr>
         </p:nvSpPr>
-        <p:spPr/>
-        <p:txBody>
-          <a:bodyPr/>
-          <a:lstStyle/>
-          <a:p>
-            <a:r>
-              <a:rPr lang="en-US"/>
-              <a:t>Click to edit Master title style</a:t>
-            </a:r>
-            <a:endParaRPr lang="en-US" dirty="0"/>
-          </a:p>
-        </p:txBody>
-      </p:sp>
-      <p:sp>
-        <p:nvSpPr>
-          <p:cNvPr id="3" name="Text Placeholder 2"/>
-          <p:cNvSpPr>
-            <a:spLocks noGrp="1"/>
-          </p:cNvSpPr>
-          <p:nvPr>
-            <p:ph type="body" idx="1"/>
-          </p:nvPr>
-        </p:nvSpPr>
         <p:spPr>
           <a:xfrm>
-            <a:off x="946404" y="1717185"/>
-            <a:ext cx="3360420" cy="731520"/>
+            <a:off x="822960" y="286604"/>
+            <a:ext cx="7543800" cy="1450757"/>
           </a:xfrm>
         </p:spPr>
         <p:txBody>
-          <a:bodyPr anchor="b">
+          <a:bodyPr/>
+          <a:lstStyle/>
+          <a:p>
+            <a:r>
+              <a:rPr lang="en-US"/>
+              <a:t>Click to edit Master title style</a:t>
+            </a:r>
+            <a:endParaRPr lang="en-US" dirty="0"/>
+          </a:p>
+        </p:txBody>
+      </p:sp>
+      <p:sp>
+        <p:nvSpPr>
+          <p:cNvPr id="3" name="Text Placeholder 2"/>
+          <p:cNvSpPr>
+            <a:spLocks noGrp="1"/>
+          </p:cNvSpPr>
+          <p:nvPr>
+            <p:ph type="body" idx="1"/>
+          </p:nvPr>
+        </p:nvSpPr>
+        <p:spPr>
+          <a:xfrm>
+            <a:off x="822960" y="1846052"/>
+            <a:ext cx="3703320" cy="736282"/>
+          </a:xfrm>
+        </p:spPr>
+        <p:txBody>
+          <a:bodyPr lIns="91440" rIns="91440" anchor="ctr">
             <a:normAutofit/>
           </a:bodyPr>
           <a:lstStyle>
             <a:lvl1pPr marL="0" indent="0">
-              <a:spcBef>
-                <a:spcPts val="0"/>
-              </a:spcBef>
-              <a:buNone/>
-              <a:defRPr sz="1800" b="0">
+              <a:buNone/>
+              <a:defRPr sz="2000" b="0" cap="all" baseline="0">
                 <a:solidFill>
                   <a:schemeClr val="tx2"/>
                 </a:solidFill>
@@ -1946,7 +2097,7 @@
             </a:lvl1pPr>
             <a:lvl2pPr marL="457200" indent="0">
               <a:buNone/>
-              <a:defRPr sz="1800" b="1"/>
+              <a:defRPr sz="2000" b="1"/>
             </a:lvl2pPr>
             <a:lvl3pPr marL="914400" indent="0">
               <a:buNone/>
@@ -1998,41 +2149,13 @@
         </p:nvSpPr>
         <p:spPr>
           <a:xfrm>
-            <a:off x="946404" y="2507550"/>
-            <a:ext cx="3360420" cy="3664650"/>
+            <a:off x="822960" y="2582334"/>
+            <a:ext cx="3703320" cy="3286760"/>
           </a:xfrm>
         </p:spPr>
         <p:txBody>
           <a:bodyPr/>
-          <a:lstStyle>
-            <a:lvl1pPr>
-              <a:defRPr sz="1800"/>
-            </a:lvl1pPr>
-            <a:lvl2pPr>
-              <a:defRPr sz="1600"/>
-            </a:lvl2pPr>
-            <a:lvl3pPr>
-              <a:defRPr sz="1400"/>
-            </a:lvl3pPr>
-            <a:lvl4pPr>
-              <a:defRPr sz="1400"/>
-            </a:lvl4pPr>
-            <a:lvl5pPr>
-              <a:defRPr sz="1400"/>
-            </a:lvl5pPr>
-            <a:lvl6pPr>
-              <a:defRPr sz="1400"/>
-            </a:lvl6pPr>
-            <a:lvl7pPr>
-              <a:defRPr sz="1400"/>
-            </a:lvl7pPr>
-            <a:lvl8pPr>
-              <a:defRPr sz="1400"/>
-            </a:lvl8pPr>
-            <a:lvl9pPr>
-              <a:defRPr sz="1400"/>
-            </a:lvl9pPr>
-          </a:lstStyle>
+          <a:lstStyle/>
           <a:p>
             <a:pPr lvl="0"/>
             <a:r>
@@ -2073,55 +2196,68 @@
       </p:sp>
       <p:sp>
         <p:nvSpPr>
-          <p:cNvPr id="11" name="Text Placeholder 10"/>
-          <p:cNvSpPr>
-            <a:spLocks noGrp="1"/>
-          </p:cNvSpPr>
-          <p:nvPr>
-            <p:ph type="body" sz="quarter" idx="13"/>
+          <p:cNvPr id="5" name="Text Placeholder 4"/>
+          <p:cNvSpPr>
+            <a:spLocks noGrp="1"/>
+          </p:cNvSpPr>
+          <p:nvPr>
+            <p:ph type="body" sz="quarter" idx="3"/>
           </p:nvPr>
         </p:nvSpPr>
         <p:spPr>
           <a:xfrm>
-            <a:off x="4599432" y="1717185"/>
-            <a:ext cx="3364992" cy="731520"/>
+            <a:off x="4663440" y="1846052"/>
+            <a:ext cx="3703320" cy="736282"/>
           </a:xfrm>
         </p:spPr>
         <p:txBody>
-          <a:bodyPr anchor="b">
+          <a:bodyPr lIns="91440" rIns="91440" anchor="ctr">
             <a:normAutofit/>
           </a:bodyPr>
           <a:lstStyle>
             <a:lvl1pPr marL="0" indent="0">
-              <a:buFontTx/>
-              <a:buNone/>
-              <a:defRPr lang="en-US" sz="1800" b="0" kern="1200" spc="10" baseline="0" dirty="0">
+              <a:buNone/>
+              <a:defRPr sz="2000" b="0" cap="all" baseline="0">
                 <a:solidFill>
                   <a:schemeClr val="tx2"/>
                 </a:solidFill>
-                <a:latin typeface="+mn-lt"/>
-                <a:ea typeface="+mn-ea"/>
-                <a:cs typeface="+mn-cs"/>
               </a:defRPr>
             </a:lvl1pPr>
+            <a:lvl2pPr marL="457200" indent="0">
+              <a:buNone/>
+              <a:defRPr sz="2000" b="1"/>
+            </a:lvl2pPr>
+            <a:lvl3pPr marL="914400" indent="0">
+              <a:buNone/>
+              <a:defRPr sz="1800" b="1"/>
+            </a:lvl3pPr>
+            <a:lvl4pPr marL="1371600" indent="0">
+              <a:buNone/>
+              <a:defRPr sz="1600" b="1"/>
+            </a:lvl4pPr>
+            <a:lvl5pPr marL="1828800" indent="0">
+              <a:buNone/>
+              <a:defRPr sz="1600" b="1"/>
+            </a:lvl5pPr>
+            <a:lvl6pPr marL="2286000" indent="0">
+              <a:buNone/>
+              <a:defRPr sz="1600" b="1"/>
+            </a:lvl6pPr>
+            <a:lvl7pPr marL="2743200" indent="0">
+              <a:buNone/>
+              <a:defRPr sz="1600" b="1"/>
+            </a:lvl7pPr>
+            <a:lvl8pPr marL="3200400" indent="0">
+              <a:buNone/>
+              <a:defRPr sz="1600" b="1"/>
+            </a:lvl8pPr>
+            <a:lvl9pPr marL="3657600" indent="0">
+              <a:buNone/>
+              <a:defRPr sz="1600" b="1"/>
+            </a:lvl9pPr>
           </a:lstStyle>
           <a:p>
-            <a:pPr marL="0" lvl="0" indent="0" algn="l" defTabSz="914400" rtl="0" eaLnBrk="1" latinLnBrk="0" hangingPunct="1">
-              <a:lnSpc>
-                <a:spcPct val="95000"/>
-              </a:lnSpc>
-              <a:spcBef>
-                <a:spcPts val="0"/>
-              </a:spcBef>
-              <a:spcAft>
-                <a:spcPts val="200"/>
-              </a:spcAft>
-              <a:buClr>
-                <a:schemeClr val="accent1"/>
-              </a:buClr>
-              <a:buSzPct val="80000"/>
-              <a:buNone/>
-            </a:pPr>
+            <a:pPr lvl="0"/>
             <a:r>
               <a:rPr lang="en-US"/>
               <a:t>Click to edit Master text styles</a:t>
@@ -2141,41 +2277,13 @@
         </p:nvSpPr>
         <p:spPr>
           <a:xfrm>
-            <a:off x="4594860" y="2507550"/>
-            <a:ext cx="3360420" cy="3664650"/>
+            <a:off x="4663440" y="2582334"/>
+            <a:ext cx="3703320" cy="3286760"/>
           </a:xfrm>
         </p:spPr>
         <p:txBody>
           <a:bodyPr/>
-          <a:lstStyle>
-            <a:lvl1pPr>
-              <a:defRPr sz="1800"/>
-            </a:lvl1pPr>
-            <a:lvl2pPr>
-              <a:defRPr sz="1600"/>
-            </a:lvl2pPr>
-            <a:lvl3pPr>
-              <a:defRPr sz="1400"/>
-            </a:lvl3pPr>
-            <a:lvl4pPr>
-              <a:defRPr sz="1400"/>
-            </a:lvl4pPr>
-            <a:lvl5pPr>
-              <a:defRPr sz="1400"/>
-            </a:lvl5pPr>
-            <a:lvl6pPr>
-              <a:defRPr sz="1400"/>
-            </a:lvl6pPr>
-            <a:lvl7pPr>
-              <a:defRPr sz="1400"/>
-            </a:lvl7pPr>
-            <a:lvl8pPr>
-              <a:defRPr sz="1400"/>
-            </a:lvl8pPr>
-            <a:lvl9pPr>
-              <a:defRPr sz="1400"/>
-            </a:lvl9pPr>
-          </a:lstStyle>
+          <a:lstStyle/>
           <a:p>
             <a:pPr lvl="0"/>
             <a:r>
@@ -2231,7 +2339,7 @@
           <a:p>
             <a:fld id="{5BCAD085-E8A6-8845-BD4E-CB4CCA059FC4}" type="datetimeFigureOut">
               <a:rPr lang="en-US" smtClean="0"/>
-              <a:t>11/4/2023</a:t>
+              <a:t>11/5/2023</a:t>
             </a:fld>
             <a:endParaRPr lang="en-US"/>
           </a:p>
@@ -2282,7 +2390,7 @@
     </p:spTree>
     <p:extLst>
       <p:ext uri="{BB962C8B-B14F-4D97-AF65-F5344CB8AC3E}">
-        <p14:creationId xmlns:p14="http://schemas.microsoft.com/office/powerpoint/2010/main" val="4104819936"/>
+        <p14:creationId xmlns:p14="http://schemas.microsoft.com/office/powerpoint/2010/main" val="3943804369"/>
       </p:ext>
     </p:extLst>
   </p:cSld>
@@ -2311,7 +2419,7 @@
       </p:grpSpPr>
       <p:sp>
         <p:nvSpPr>
-          <p:cNvPr id="6" name="Title 5"/>
+          <p:cNvPr id="2" name="Title 1"/>
           <p:cNvSpPr>
             <a:spLocks noGrp="1"/>
           </p:cNvSpPr>
@@ -2349,7 +2457,7 @@
           <a:p>
             <a:fld id="{5BCAD085-E8A6-8845-BD4E-CB4CCA059FC4}" type="datetimeFigureOut">
               <a:rPr lang="en-US" smtClean="0"/>
-              <a:t>11/4/2023</a:t>
+              <a:t>11/5/2023</a:t>
             </a:fld>
             <a:endParaRPr lang="en-US"/>
           </a:p>
@@ -2400,7 +2508,7 @@
     </p:spTree>
     <p:extLst>
       <p:ext uri="{BB962C8B-B14F-4D97-AF65-F5344CB8AC3E}">
-        <p14:creationId xmlns:p14="http://schemas.microsoft.com/office/powerpoint/2010/main" val="2680714239"/>
+        <p14:creationId xmlns:p14="http://schemas.microsoft.com/office/powerpoint/2010/main" val="2628658506"/>
       </p:ext>
     </p:extLst>
   </p:cSld>
@@ -2411,7 +2519,7 @@
 </file>
 
 <file path=ppt/slideLayouts/slideLayout7.xml><?xml version="1.0" encoding="utf-8"?>
-<p:sldLayout xmlns:a="http://schemas.openxmlformats.org/drawingml/2006/main" xmlns:r="http://schemas.openxmlformats.org/officeDocument/2006/relationships" xmlns:p="http://schemas.openxmlformats.org/presentationml/2006/main" type="blank" preserve="1">
+<p:sldLayout xmlns:a="http://schemas.openxmlformats.org/drawingml/2006/main" xmlns:r="http://schemas.openxmlformats.org/officeDocument/2006/relationships" xmlns:p="http://schemas.openxmlformats.org/presentationml/2006/main" showMasterSp="0" type="blank" preserve="1">
   <p:cSld name="Blank">
     <p:spTree>
       <p:nvGrpSpPr>
@@ -2429,402 +2537,20 @@
       </p:grpSpPr>
       <p:sp>
         <p:nvSpPr>
-          <p:cNvPr id="2" name="Date Placeholder 1"/>
-          <p:cNvSpPr>
-            <a:spLocks noGrp="1"/>
-          </p:cNvSpPr>
-          <p:nvPr>
-            <p:ph type="dt" sz="half" idx="10"/>
-          </p:nvPr>
-        </p:nvSpPr>
-        <p:spPr/>
-        <p:txBody>
-          <a:bodyPr/>
-          <a:lstStyle/>
-          <a:p>
-            <a:fld id="{5BCAD085-E8A6-8845-BD4E-CB4CCA059FC4}" type="datetimeFigureOut">
-              <a:rPr lang="en-US" smtClean="0"/>
-              <a:t>11/4/2023</a:t>
-            </a:fld>
-            <a:endParaRPr lang="en-US"/>
-          </a:p>
-        </p:txBody>
-      </p:sp>
-      <p:sp>
-        <p:nvSpPr>
-          <p:cNvPr id="3" name="Footer Placeholder 2"/>
-          <p:cNvSpPr>
-            <a:spLocks noGrp="1"/>
-          </p:cNvSpPr>
-          <p:nvPr>
-            <p:ph type="ftr" sz="quarter" idx="11"/>
-          </p:nvPr>
-        </p:nvSpPr>
-        <p:spPr/>
-        <p:txBody>
-          <a:bodyPr/>
-          <a:lstStyle/>
-          <a:p>
-            <a:endParaRPr lang="en-US"/>
-          </a:p>
-        </p:txBody>
-      </p:sp>
-      <p:sp>
-        <p:nvSpPr>
-          <p:cNvPr id="4" name="Slide Number Placeholder 3"/>
-          <p:cNvSpPr>
-            <a:spLocks noGrp="1"/>
-          </p:cNvSpPr>
-          <p:nvPr>
-            <p:ph type="sldNum" sz="quarter" idx="12"/>
-          </p:nvPr>
-        </p:nvSpPr>
-        <p:spPr/>
-        <p:txBody>
-          <a:bodyPr/>
-          <a:lstStyle/>
-          <a:p>
-            <a:fld id="{C1FF6DA9-008F-8B48-92A6-B652298478BF}" type="slidenum">
-              <a:rPr lang="en-US" smtClean="0"/>
-              <a:t>‹#›</a:t>
-            </a:fld>
-            <a:endParaRPr lang="en-US"/>
-          </a:p>
-        </p:txBody>
-      </p:sp>
-    </p:spTree>
-    <p:extLst>
-      <p:ext uri="{BB962C8B-B14F-4D97-AF65-F5344CB8AC3E}">
-        <p14:creationId xmlns:p14="http://schemas.microsoft.com/office/powerpoint/2010/main" val="168683867"/>
-      </p:ext>
-    </p:extLst>
-  </p:cSld>
-  <p:clrMapOvr>
-    <a:masterClrMapping/>
-  </p:clrMapOvr>
-</p:sldLayout>
-</file>
-
-<file path=ppt/slideLayouts/slideLayout8.xml><?xml version="1.0" encoding="utf-8"?>
-<p:sldLayout xmlns:a="http://schemas.openxmlformats.org/drawingml/2006/main" xmlns:r="http://schemas.openxmlformats.org/officeDocument/2006/relationships" xmlns:p="http://schemas.openxmlformats.org/presentationml/2006/main" type="objTx" preserve="1">
-  <p:cSld name="Content with Caption">
-    <p:spTree>
-      <p:nvGrpSpPr>
-        <p:cNvPr id="1" name=""/>
-        <p:cNvGrpSpPr/>
-        <p:nvPr/>
-      </p:nvGrpSpPr>
-      <p:grpSpPr>
-        <a:xfrm>
-          <a:off x="0" y="0"/>
-          <a:ext cx="0" cy="0"/>
-          <a:chOff x="0" y="0"/>
-          <a:chExt cx="0" cy="0"/>
-        </a:xfrm>
-      </p:grpSpPr>
-      <p:sp>
-        <p:nvSpPr>
-          <p:cNvPr id="2" name="Title 1"/>
-          <p:cNvSpPr>
-            <a:spLocks noGrp="1"/>
-          </p:cNvSpPr>
-          <p:nvPr>
-            <p:ph type="title"/>
-          </p:nvPr>
+          <p:cNvPr id="5" name="Rectangle 4"/>
+          <p:cNvSpPr/>
+          <p:nvPr/>
         </p:nvSpPr>
         <p:spPr>
           <a:xfrm>
-            <a:off x="630936" y="457201"/>
-            <a:ext cx="2400300" cy="1600197"/>
-          </a:xfrm>
-        </p:spPr>
-        <p:txBody>
-          <a:bodyPr anchor="b">
-            <a:normAutofit/>
-          </a:bodyPr>
-          <a:lstStyle>
-            <a:lvl1pPr>
-              <a:defRPr sz="2800" b="0" baseline="0"/>
-            </a:lvl1pPr>
-          </a:lstStyle>
-          <a:p>
-            <a:r>
-              <a:rPr lang="en-US"/>
-              <a:t>Click to edit Master title style</a:t>
-            </a:r>
-            <a:endParaRPr lang="en-US" dirty="0"/>
-          </a:p>
-        </p:txBody>
-      </p:sp>
-      <p:sp>
-        <p:nvSpPr>
-          <p:cNvPr id="3" name="Content Placeholder 2"/>
-          <p:cNvSpPr>
-            <a:spLocks noGrp="1"/>
-          </p:cNvSpPr>
-          <p:nvPr>
-            <p:ph idx="1"/>
-          </p:nvPr>
-        </p:nvSpPr>
-        <p:spPr>
-          <a:xfrm>
-            <a:off x="3378200" y="685800"/>
-            <a:ext cx="4559300" cy="5486400"/>
-          </a:xfrm>
-        </p:spPr>
-        <p:txBody>
-          <a:bodyPr/>
-          <a:lstStyle>
-            <a:lvl1pPr>
-              <a:defRPr sz="1800"/>
-            </a:lvl1pPr>
-            <a:lvl2pPr>
-              <a:defRPr sz="1600"/>
-            </a:lvl2pPr>
-            <a:lvl3pPr>
-              <a:defRPr sz="1400"/>
-            </a:lvl3pPr>
-            <a:lvl4pPr>
-              <a:defRPr sz="1400"/>
-            </a:lvl4pPr>
-            <a:lvl5pPr>
-              <a:defRPr sz="1400"/>
-            </a:lvl5pPr>
-            <a:lvl6pPr>
-              <a:defRPr sz="1400"/>
-            </a:lvl6pPr>
-            <a:lvl7pPr>
-              <a:defRPr sz="1400"/>
-            </a:lvl7pPr>
-            <a:lvl8pPr>
-              <a:defRPr sz="1400"/>
-            </a:lvl8pPr>
-            <a:lvl9pPr>
-              <a:defRPr sz="1400"/>
-            </a:lvl9pPr>
-          </a:lstStyle>
-          <a:p>
-            <a:pPr lvl="0"/>
-            <a:r>
-              <a:rPr lang="en-US"/>
-              <a:t>Click to edit Master text styles</a:t>
-            </a:r>
-          </a:p>
-          <a:p>
-            <a:pPr lvl="1"/>
-            <a:r>
-              <a:rPr lang="en-US"/>
-              <a:t>Second level</a:t>
-            </a:r>
-          </a:p>
-          <a:p>
-            <a:pPr lvl="2"/>
-            <a:r>
-              <a:rPr lang="en-US"/>
-              <a:t>Third level</a:t>
-            </a:r>
-          </a:p>
-          <a:p>
-            <a:pPr lvl="3"/>
-            <a:r>
-              <a:rPr lang="en-US"/>
-              <a:t>Fourth level</a:t>
-            </a:r>
-          </a:p>
-          <a:p>
-            <a:pPr lvl="4"/>
-            <a:r>
-              <a:rPr lang="en-US"/>
-              <a:t>Fifth level</a:t>
-            </a:r>
-            <a:endParaRPr lang="en-US" dirty="0"/>
-          </a:p>
-        </p:txBody>
-      </p:sp>
-      <p:sp>
-        <p:nvSpPr>
-          <p:cNvPr id="4" name="Text Placeholder 3"/>
-          <p:cNvSpPr>
-            <a:spLocks noGrp="1"/>
-          </p:cNvSpPr>
-          <p:nvPr>
-            <p:ph type="body" sz="half" idx="2"/>
-          </p:nvPr>
-        </p:nvSpPr>
-        <p:spPr>
-          <a:xfrm>
-            <a:off x="630936" y="2099735"/>
-            <a:ext cx="2400300" cy="3810001"/>
-          </a:xfrm>
-        </p:spPr>
-        <p:txBody>
-          <a:bodyPr>
-            <a:normAutofit/>
-          </a:bodyPr>
-          <a:lstStyle>
-            <a:lvl1pPr marL="0" indent="0">
-              <a:lnSpc>
-                <a:spcPct val="114000"/>
-              </a:lnSpc>
-              <a:spcBef>
-                <a:spcPts val="800"/>
-              </a:spcBef>
-              <a:buNone/>
-              <a:defRPr sz="1300"/>
-            </a:lvl1pPr>
-            <a:lvl2pPr marL="457200" indent="0">
-              <a:buNone/>
-              <a:defRPr sz="1200"/>
-            </a:lvl2pPr>
-            <a:lvl3pPr marL="914400" indent="0">
-              <a:buNone/>
-              <a:defRPr sz="1000"/>
-            </a:lvl3pPr>
-            <a:lvl4pPr marL="1371600" indent="0">
-              <a:buNone/>
-              <a:defRPr sz="900"/>
-            </a:lvl4pPr>
-            <a:lvl5pPr marL="1828800" indent="0">
-              <a:buNone/>
-              <a:defRPr sz="900"/>
-            </a:lvl5pPr>
-            <a:lvl6pPr marL="2286000" indent="0">
-              <a:buNone/>
-              <a:defRPr sz="900"/>
-            </a:lvl6pPr>
-            <a:lvl7pPr marL="2743200" indent="0">
-              <a:buNone/>
-              <a:defRPr sz="900"/>
-            </a:lvl7pPr>
-            <a:lvl8pPr marL="3200400" indent="0">
-              <a:buNone/>
-              <a:defRPr sz="900"/>
-            </a:lvl8pPr>
-            <a:lvl9pPr marL="3657600" indent="0">
-              <a:buNone/>
-              <a:defRPr sz="900"/>
-            </a:lvl9pPr>
-          </a:lstStyle>
-          <a:p>
-            <a:pPr lvl="0"/>
-            <a:r>
-              <a:rPr lang="en-US"/>
-              <a:t>Click to edit Master text styles</a:t>
-            </a:r>
-          </a:p>
-        </p:txBody>
-      </p:sp>
-      <p:sp>
-        <p:nvSpPr>
-          <p:cNvPr id="5" name="Date Placeholder 4"/>
-          <p:cNvSpPr>
-            <a:spLocks noGrp="1"/>
-          </p:cNvSpPr>
-          <p:nvPr>
-            <p:ph type="dt" sz="half" idx="10"/>
-          </p:nvPr>
-        </p:nvSpPr>
-        <p:spPr/>
-        <p:txBody>
-          <a:bodyPr/>
-          <a:lstStyle/>
-          <a:p>
-            <a:fld id="{5BCAD085-E8A6-8845-BD4E-CB4CCA059FC4}" type="datetimeFigureOut">
-              <a:rPr lang="en-US" smtClean="0"/>
-              <a:t>11/4/2023</a:t>
-            </a:fld>
-            <a:endParaRPr lang="en-US"/>
-          </a:p>
-        </p:txBody>
-      </p:sp>
-      <p:sp>
-        <p:nvSpPr>
-          <p:cNvPr id="6" name="Footer Placeholder 5"/>
-          <p:cNvSpPr>
-            <a:spLocks noGrp="1"/>
-          </p:cNvSpPr>
-          <p:nvPr>
-            <p:ph type="ftr" sz="quarter" idx="11"/>
-          </p:nvPr>
-        </p:nvSpPr>
-        <p:spPr/>
-        <p:txBody>
-          <a:bodyPr/>
-          <a:lstStyle/>
-          <a:p>
-            <a:endParaRPr lang="en-US"/>
-          </a:p>
-        </p:txBody>
-      </p:sp>
-      <p:sp>
-        <p:nvSpPr>
-          <p:cNvPr id="7" name="Slide Number Placeholder 6"/>
-          <p:cNvSpPr>
-            <a:spLocks noGrp="1"/>
-          </p:cNvSpPr>
-          <p:nvPr>
-            <p:ph type="sldNum" sz="quarter" idx="12"/>
-          </p:nvPr>
-        </p:nvSpPr>
-        <p:spPr/>
-        <p:txBody>
-          <a:bodyPr/>
-          <a:lstStyle/>
-          <a:p>
-            <a:fld id="{C1FF6DA9-008F-8B48-92A6-B652298478BF}" type="slidenum">
-              <a:rPr lang="en-US" smtClean="0"/>
-              <a:t>‹#›</a:t>
-            </a:fld>
-            <a:endParaRPr lang="en-US"/>
-          </a:p>
-        </p:txBody>
-      </p:sp>
-    </p:spTree>
-    <p:extLst>
-      <p:ext uri="{BB962C8B-B14F-4D97-AF65-F5344CB8AC3E}">
-        <p14:creationId xmlns:p14="http://schemas.microsoft.com/office/powerpoint/2010/main" val="691041300"/>
-      </p:ext>
-    </p:extLst>
-  </p:cSld>
-  <p:clrMapOvr>
-    <a:masterClrMapping/>
-  </p:clrMapOvr>
-</p:sldLayout>
-</file>
-
-<file path=ppt/slideLayouts/slideLayout9.xml><?xml version="1.0" encoding="utf-8"?>
-<p:sldLayout xmlns:a="http://schemas.openxmlformats.org/drawingml/2006/main" xmlns:r="http://schemas.openxmlformats.org/officeDocument/2006/relationships" xmlns:p="http://schemas.openxmlformats.org/presentationml/2006/main" type="picTx" preserve="1">
-  <p:cSld name="Picture with Caption">
-    <p:spTree>
-      <p:nvGrpSpPr>
-        <p:cNvPr id="1" name=""/>
-        <p:cNvGrpSpPr/>
-        <p:nvPr/>
-      </p:nvGrpSpPr>
-      <p:grpSpPr>
-        <a:xfrm>
-          <a:off x="0" y="0"/>
-          <a:ext cx="0" cy="0"/>
-          <a:chOff x="0" y="0"/>
-          <a:chExt cx="0" cy="0"/>
-        </a:xfrm>
-      </p:grpSpPr>
-      <p:sp>
-        <p:nvSpPr>
-          <p:cNvPr id="8" name="Rectangle 7"/>
-          <p:cNvSpPr/>
-          <p:nvPr/>
-        </p:nvSpPr>
-        <p:spPr>
-          <a:xfrm>
-            <a:off x="0" y="5105400"/>
-            <a:ext cx="8469630" cy="1752600"/>
+            <a:off x="2382" y="6400800"/>
+            <a:ext cx="9141619" cy="457200"/>
           </a:xfrm>
           <a:prstGeom prst="rect">
             <a:avLst/>
           </a:prstGeom>
           <a:solidFill>
-            <a:srgbClr val="000000"/>
+            <a:schemeClr val="accent2"/>
           </a:solidFill>
           <a:ln>
             <a:noFill/>
@@ -2849,18 +2575,235 @@
       </p:sp>
       <p:sp>
         <p:nvSpPr>
-          <p:cNvPr id="2" name="Title 1"/>
-          <p:cNvSpPr>
-            <a:spLocks noGrp="1"/>
-          </p:cNvSpPr>
-          <p:nvPr>
-            <p:ph type="title"/>
-          </p:nvPr>
+          <p:cNvPr id="6" name="Rectangle 5"/>
+          <p:cNvSpPr/>
+          <p:nvPr/>
         </p:nvSpPr>
         <p:spPr>
           <a:xfrm>
-            <a:off x="685800" y="5257800"/>
-            <a:ext cx="7486650" cy="914400"/>
+            <a:off x="12" y="6334316"/>
+            <a:ext cx="9141619" cy="64008"/>
+          </a:xfrm>
+          <a:prstGeom prst="rect">
+            <a:avLst/>
+          </a:prstGeom>
+          <a:solidFill>
+            <a:schemeClr val="accent1"/>
+          </a:solidFill>
+          <a:ln>
+            <a:noFill/>
+          </a:ln>
+        </p:spPr>
+        <p:style>
+          <a:lnRef idx="2">
+            <a:schemeClr val="accent1">
+              <a:shade val="50000"/>
+            </a:schemeClr>
+          </a:lnRef>
+          <a:fillRef idx="1">
+            <a:schemeClr val="accent1"/>
+          </a:fillRef>
+          <a:effectRef idx="0">
+            <a:schemeClr val="accent1"/>
+          </a:effectRef>
+          <a:fontRef idx="minor">
+            <a:schemeClr val="lt1"/>
+          </a:fontRef>
+        </p:style>
+      </p:sp>
+      <p:sp>
+        <p:nvSpPr>
+          <p:cNvPr id="7" name="Date Placeholder 6"/>
+          <p:cNvSpPr>
+            <a:spLocks noGrp="1"/>
+          </p:cNvSpPr>
+          <p:nvPr>
+            <p:ph type="dt" sz="half" idx="10"/>
+          </p:nvPr>
+        </p:nvSpPr>
+        <p:spPr/>
+        <p:txBody>
+          <a:bodyPr/>
+          <a:lstStyle/>
+          <a:p>
+            <a:fld id="{5BCAD085-E8A6-8845-BD4E-CB4CCA059FC4}" type="datetimeFigureOut">
+              <a:rPr lang="en-US" smtClean="0"/>
+              <a:t>11/5/2023</a:t>
+            </a:fld>
+            <a:endParaRPr lang="en-US"/>
+          </a:p>
+        </p:txBody>
+      </p:sp>
+      <p:sp>
+        <p:nvSpPr>
+          <p:cNvPr id="8" name="Footer Placeholder 7"/>
+          <p:cNvSpPr>
+            <a:spLocks noGrp="1"/>
+          </p:cNvSpPr>
+          <p:nvPr>
+            <p:ph type="ftr" sz="quarter" idx="11"/>
+          </p:nvPr>
+        </p:nvSpPr>
+        <p:spPr/>
+        <p:txBody>
+          <a:bodyPr/>
+          <a:lstStyle>
+            <a:lvl1pPr>
+              <a:defRPr>
+                <a:solidFill>
+                  <a:srgbClr val="FFFFFF"/>
+                </a:solidFill>
+              </a:defRPr>
+            </a:lvl1pPr>
+          </a:lstStyle>
+          <a:p>
+            <a:endParaRPr lang="en-US"/>
+          </a:p>
+        </p:txBody>
+      </p:sp>
+      <p:sp>
+        <p:nvSpPr>
+          <p:cNvPr id="9" name="Slide Number Placeholder 8"/>
+          <p:cNvSpPr>
+            <a:spLocks noGrp="1"/>
+          </p:cNvSpPr>
+          <p:nvPr>
+            <p:ph type="sldNum" sz="quarter" idx="12"/>
+          </p:nvPr>
+        </p:nvSpPr>
+        <p:spPr/>
+        <p:txBody>
+          <a:bodyPr/>
+          <a:lstStyle/>
+          <a:p>
+            <a:fld id="{C1FF6DA9-008F-8B48-92A6-B652298478BF}" type="slidenum">
+              <a:rPr lang="en-US" smtClean="0"/>
+              <a:t>‹#›</a:t>
+            </a:fld>
+            <a:endParaRPr lang="en-US"/>
+          </a:p>
+        </p:txBody>
+      </p:sp>
+    </p:spTree>
+    <p:extLst>
+      <p:ext uri="{BB962C8B-B14F-4D97-AF65-F5344CB8AC3E}">
+        <p14:creationId xmlns:p14="http://schemas.microsoft.com/office/powerpoint/2010/main" val="3525222323"/>
+      </p:ext>
+    </p:extLst>
+  </p:cSld>
+  <p:clrMapOvr>
+    <a:masterClrMapping/>
+  </p:clrMapOvr>
+</p:sldLayout>
+</file>
+
+<file path=ppt/slideLayouts/slideLayout8.xml><?xml version="1.0" encoding="utf-8"?>
+<p:sldLayout xmlns:a="http://schemas.openxmlformats.org/drawingml/2006/main" xmlns:r="http://schemas.openxmlformats.org/officeDocument/2006/relationships" xmlns:p="http://schemas.openxmlformats.org/presentationml/2006/main" showMasterSp="0" type="objTx" preserve="1">
+  <p:cSld name="Content with Caption">
+    <p:spTree>
+      <p:nvGrpSpPr>
+        <p:cNvPr id="1" name=""/>
+        <p:cNvGrpSpPr/>
+        <p:nvPr/>
+      </p:nvGrpSpPr>
+      <p:grpSpPr>
+        <a:xfrm>
+          <a:off x="0" y="0"/>
+          <a:ext cx="0" cy="0"/>
+          <a:chOff x="0" y="0"/>
+          <a:chExt cx="0" cy="0"/>
+        </a:xfrm>
+      </p:grpSpPr>
+      <p:sp>
+        <p:nvSpPr>
+          <p:cNvPr id="8" name="Rectangle 7"/>
+          <p:cNvSpPr/>
+          <p:nvPr/>
+        </p:nvSpPr>
+        <p:spPr>
+          <a:xfrm>
+            <a:off x="13" y="0"/>
+            <a:ext cx="3038093" cy="6858000"/>
+          </a:xfrm>
+          <a:prstGeom prst="rect">
+            <a:avLst/>
+          </a:prstGeom>
+          <a:solidFill>
+            <a:schemeClr val="accent2"/>
+          </a:solidFill>
+          <a:ln>
+            <a:noFill/>
+          </a:ln>
+        </p:spPr>
+        <p:style>
+          <a:lnRef idx="2">
+            <a:schemeClr val="accent1">
+              <a:shade val="50000"/>
+            </a:schemeClr>
+          </a:lnRef>
+          <a:fillRef idx="1">
+            <a:schemeClr val="accent1"/>
+          </a:fillRef>
+          <a:effectRef idx="0">
+            <a:schemeClr val="accent1"/>
+          </a:effectRef>
+          <a:fontRef idx="minor">
+            <a:schemeClr val="lt1"/>
+          </a:fontRef>
+        </p:style>
+      </p:sp>
+      <p:sp>
+        <p:nvSpPr>
+          <p:cNvPr id="9" name="Rectangle 8"/>
+          <p:cNvSpPr/>
+          <p:nvPr/>
+        </p:nvSpPr>
+        <p:spPr>
+          <a:xfrm>
+            <a:off x="3030053" y="0"/>
+            <a:ext cx="48006" cy="6858000"/>
+          </a:xfrm>
+          <a:prstGeom prst="rect">
+            <a:avLst/>
+          </a:prstGeom>
+          <a:solidFill>
+            <a:schemeClr val="accent1"/>
+          </a:solidFill>
+          <a:ln>
+            <a:noFill/>
+          </a:ln>
+        </p:spPr>
+        <p:style>
+          <a:lnRef idx="2">
+            <a:schemeClr val="accent1">
+              <a:shade val="50000"/>
+            </a:schemeClr>
+          </a:lnRef>
+          <a:fillRef idx="1">
+            <a:schemeClr val="accent1"/>
+          </a:fillRef>
+          <a:effectRef idx="0">
+            <a:schemeClr val="accent1"/>
+          </a:effectRef>
+          <a:fontRef idx="minor">
+            <a:schemeClr val="lt1"/>
+          </a:fontRef>
+        </p:style>
+      </p:sp>
+      <p:sp>
+        <p:nvSpPr>
+          <p:cNvPr id="2" name="Title 1"/>
+          <p:cNvSpPr>
+            <a:spLocks noGrp="1"/>
+          </p:cNvSpPr>
+          <p:nvPr>
+            <p:ph type="title"/>
+          </p:nvPr>
+        </p:nvSpPr>
+        <p:spPr>
+          <a:xfrm>
+            <a:off x="342900" y="594359"/>
+            <a:ext cx="2400300" cy="2286000"/>
           </a:xfrm>
         </p:spPr>
         <p:txBody>
@@ -2869,9 +2812,9 @@
           </a:bodyPr>
           <a:lstStyle>
             <a:lvl1pPr>
-              <a:defRPr sz="2800" b="0">
+              <a:defRPr sz="3600" b="0">
                 <a:solidFill>
-                  <a:schemeClr val="bg1"/>
+                  <a:srgbClr val="FFFFFF"/>
                 </a:solidFill>
               </a:defRPr>
             </a:lvl1pPr>
@@ -2887,25 +2830,395 @@
       </p:sp>
       <p:sp>
         <p:nvSpPr>
-          <p:cNvPr id="3" name="Picture Placeholder 2"/>
-          <p:cNvSpPr>
-            <a:spLocks noGrp="1" noChangeAspect="1"/>
-          </p:cNvSpPr>
-          <p:nvPr>
-            <p:ph type="pic" idx="1"/>
+          <p:cNvPr id="3" name="Content Placeholder 2"/>
+          <p:cNvSpPr>
+            <a:spLocks noGrp="1"/>
+          </p:cNvSpPr>
+          <p:nvPr>
+            <p:ph idx="1"/>
           </p:nvPr>
         </p:nvSpPr>
         <p:spPr>
           <a:xfrm>
-            <a:off x="0" y="1"/>
-            <a:ext cx="8469630" cy="5128923"/>
+            <a:off x="3460237" y="731520"/>
+            <a:ext cx="5009393" cy="5257800"/>
           </a:xfrm>
+        </p:spPr>
+        <p:txBody>
+          <a:bodyPr/>
+          <a:lstStyle/>
+          <a:p>
+            <a:pPr lvl="0"/>
+            <a:r>
+              <a:rPr lang="en-US"/>
+              <a:t>Click to edit Master text styles</a:t>
+            </a:r>
+          </a:p>
+          <a:p>
+            <a:pPr lvl="1"/>
+            <a:r>
+              <a:rPr lang="en-US"/>
+              <a:t>Second level</a:t>
+            </a:r>
+          </a:p>
+          <a:p>
+            <a:pPr lvl="2"/>
+            <a:r>
+              <a:rPr lang="en-US"/>
+              <a:t>Third level</a:t>
+            </a:r>
+          </a:p>
+          <a:p>
+            <a:pPr lvl="3"/>
+            <a:r>
+              <a:rPr lang="en-US"/>
+              <a:t>Fourth level</a:t>
+            </a:r>
+          </a:p>
+          <a:p>
+            <a:pPr lvl="4"/>
+            <a:r>
+              <a:rPr lang="en-US"/>
+              <a:t>Fifth level</a:t>
+            </a:r>
+            <a:endParaRPr lang="en-US" dirty="0"/>
+          </a:p>
+        </p:txBody>
+      </p:sp>
+      <p:sp>
+        <p:nvSpPr>
+          <p:cNvPr id="4" name="Text Placeholder 3"/>
+          <p:cNvSpPr>
+            <a:spLocks noGrp="1"/>
+          </p:cNvSpPr>
+          <p:nvPr>
+            <p:ph type="body" sz="half" idx="2"/>
+          </p:nvPr>
+        </p:nvSpPr>
+        <p:spPr>
+          <a:xfrm>
+            <a:off x="342900" y="2926080"/>
+            <a:ext cx="2400300" cy="3379124"/>
+          </a:xfrm>
+        </p:spPr>
+        <p:txBody>
+          <a:bodyPr lIns="91440" rIns="91440">
+            <a:normAutofit/>
+          </a:bodyPr>
+          <a:lstStyle>
+            <a:lvl1pPr marL="0" indent="0">
+              <a:buNone/>
+              <a:defRPr sz="1500">
+                <a:solidFill>
+                  <a:srgbClr val="FFFFFF"/>
+                </a:solidFill>
+              </a:defRPr>
+            </a:lvl1pPr>
+            <a:lvl2pPr marL="457200" indent="0">
+              <a:buNone/>
+              <a:defRPr sz="1200"/>
+            </a:lvl2pPr>
+            <a:lvl3pPr marL="914400" indent="0">
+              <a:buNone/>
+              <a:defRPr sz="1000"/>
+            </a:lvl3pPr>
+            <a:lvl4pPr marL="1371600" indent="0">
+              <a:buNone/>
+              <a:defRPr sz="900"/>
+            </a:lvl4pPr>
+            <a:lvl5pPr marL="1828800" indent="0">
+              <a:buNone/>
+              <a:defRPr sz="900"/>
+            </a:lvl5pPr>
+            <a:lvl6pPr marL="2286000" indent="0">
+              <a:buNone/>
+              <a:defRPr sz="900"/>
+            </a:lvl6pPr>
+            <a:lvl7pPr marL="2743200" indent="0">
+              <a:buNone/>
+              <a:defRPr sz="900"/>
+            </a:lvl7pPr>
+            <a:lvl8pPr marL="3200400" indent="0">
+              <a:buNone/>
+              <a:defRPr sz="900"/>
+            </a:lvl8pPr>
+            <a:lvl9pPr marL="3657600" indent="0">
+              <a:buNone/>
+              <a:defRPr sz="900"/>
+            </a:lvl9pPr>
+          </a:lstStyle>
+          <a:p>
+            <a:pPr lvl="0"/>
+            <a:r>
+              <a:rPr lang="en-US"/>
+              <a:t>Click to edit Master text styles</a:t>
+            </a:r>
+          </a:p>
+        </p:txBody>
+      </p:sp>
+      <p:sp>
+        <p:nvSpPr>
+          <p:cNvPr id="5" name="Date Placeholder 4"/>
+          <p:cNvSpPr>
+            <a:spLocks noGrp="1"/>
+          </p:cNvSpPr>
+          <p:nvPr>
+            <p:ph type="dt" sz="half" idx="10"/>
+          </p:nvPr>
+        </p:nvSpPr>
+        <p:spPr>
+          <a:xfrm>
+            <a:off x="349134" y="6459786"/>
+            <a:ext cx="1963883" cy="365125"/>
+          </a:xfrm>
+        </p:spPr>
+        <p:txBody>
+          <a:bodyPr/>
+          <a:lstStyle>
+            <a:lvl1pPr algn="l">
+              <a:defRPr/>
+            </a:lvl1pPr>
+          </a:lstStyle>
+          <a:p>
+            <a:fld id="{5BCAD085-E8A6-8845-BD4E-CB4CCA059FC4}" type="datetimeFigureOut">
+              <a:rPr lang="en-US" smtClean="0"/>
+              <a:t>11/5/2023</a:t>
+            </a:fld>
+            <a:endParaRPr lang="en-US"/>
+          </a:p>
+        </p:txBody>
+      </p:sp>
+      <p:sp>
+        <p:nvSpPr>
+          <p:cNvPr id="6" name="Footer Placeholder 5"/>
+          <p:cNvSpPr>
+            <a:spLocks noGrp="1"/>
+          </p:cNvSpPr>
+          <p:nvPr>
+            <p:ph type="ftr" sz="quarter" idx="11"/>
+          </p:nvPr>
+        </p:nvSpPr>
+        <p:spPr>
+          <a:xfrm>
+            <a:off x="3600450" y="6459786"/>
+            <a:ext cx="3486150" cy="365125"/>
+          </a:xfrm>
+        </p:spPr>
+        <p:txBody>
+          <a:bodyPr/>
+          <a:lstStyle>
+            <a:lvl1pPr algn="l">
+              <a:defRPr>
+                <a:solidFill>
+                  <a:schemeClr val="tx2"/>
+                </a:solidFill>
+              </a:defRPr>
+            </a:lvl1pPr>
+          </a:lstStyle>
+          <a:p>
+            <a:endParaRPr lang="en-US"/>
+          </a:p>
+        </p:txBody>
+      </p:sp>
+      <p:sp>
+        <p:nvSpPr>
+          <p:cNvPr id="7" name="Slide Number Placeholder 6"/>
+          <p:cNvSpPr>
+            <a:spLocks noGrp="1"/>
+          </p:cNvSpPr>
+          <p:nvPr>
+            <p:ph type="sldNum" sz="quarter" idx="12"/>
+          </p:nvPr>
+        </p:nvSpPr>
+        <p:spPr/>
+        <p:txBody>
+          <a:bodyPr/>
+          <a:lstStyle>
+            <a:lvl1pPr>
+              <a:defRPr>
+                <a:solidFill>
+                  <a:schemeClr val="tx2"/>
+                </a:solidFill>
+              </a:defRPr>
+            </a:lvl1pPr>
+          </a:lstStyle>
+          <a:p>
+            <a:fld id="{C1FF6DA9-008F-8B48-92A6-B652298478BF}" type="slidenum">
+              <a:rPr lang="en-US" smtClean="0"/>
+              <a:t>‹#›</a:t>
+            </a:fld>
+            <a:endParaRPr lang="en-US"/>
+          </a:p>
+        </p:txBody>
+      </p:sp>
+    </p:spTree>
+    <p:extLst>
+      <p:ext uri="{BB962C8B-B14F-4D97-AF65-F5344CB8AC3E}">
+        <p14:creationId xmlns:p14="http://schemas.microsoft.com/office/powerpoint/2010/main" val="337878923"/>
+      </p:ext>
+    </p:extLst>
+  </p:cSld>
+  <p:clrMapOvr>
+    <a:masterClrMapping/>
+  </p:clrMapOvr>
+</p:sldLayout>
+</file>
+
+<file path=ppt/slideLayouts/slideLayout9.xml><?xml version="1.0" encoding="utf-8"?>
+<p:sldLayout xmlns:a="http://schemas.openxmlformats.org/drawingml/2006/main" xmlns:r="http://schemas.openxmlformats.org/officeDocument/2006/relationships" xmlns:p="http://schemas.openxmlformats.org/presentationml/2006/main" showMasterSp="0" type="picTx" preserve="1">
+  <p:cSld name="Picture with Caption">
+    <p:spTree>
+      <p:nvGrpSpPr>
+        <p:cNvPr id="1" name=""/>
+        <p:cNvGrpSpPr/>
+        <p:nvPr/>
+      </p:nvGrpSpPr>
+      <p:grpSpPr>
+        <a:xfrm>
+          <a:off x="0" y="0"/>
+          <a:ext cx="0" cy="0"/>
+          <a:chOff x="0" y="0"/>
+          <a:chExt cx="0" cy="0"/>
+        </a:xfrm>
+      </p:grpSpPr>
+      <p:sp>
+        <p:nvSpPr>
+          <p:cNvPr id="8" name="Rectangle 7"/>
+          <p:cNvSpPr/>
+          <p:nvPr/>
+        </p:nvSpPr>
+        <p:spPr>
+          <a:xfrm>
+            <a:off x="0" y="4953000"/>
+            <a:ext cx="9141619" cy="1905000"/>
+          </a:xfrm>
+          <a:prstGeom prst="rect">
+            <a:avLst/>
+          </a:prstGeom>
+          <a:solidFill>
+            <a:schemeClr val="accent2"/>
+          </a:solidFill>
+          <a:ln>
+            <a:noFill/>
+          </a:ln>
+        </p:spPr>
+        <p:style>
+          <a:lnRef idx="2">
+            <a:schemeClr val="accent1">
+              <a:shade val="50000"/>
+            </a:schemeClr>
+          </a:lnRef>
+          <a:fillRef idx="1">
+            <a:schemeClr val="accent1"/>
+          </a:fillRef>
+          <a:effectRef idx="0">
+            <a:schemeClr val="accent1"/>
+          </a:effectRef>
+          <a:fontRef idx="minor">
+            <a:schemeClr val="lt1"/>
+          </a:fontRef>
+        </p:style>
+      </p:sp>
+      <p:sp>
+        <p:nvSpPr>
+          <p:cNvPr id="9" name="Rectangle 8"/>
+          <p:cNvSpPr/>
+          <p:nvPr/>
+        </p:nvSpPr>
+        <p:spPr>
+          <a:xfrm>
+            <a:off x="12" y="4915076"/>
+            <a:ext cx="9141619" cy="64008"/>
+          </a:xfrm>
+          <a:prstGeom prst="rect">
+            <a:avLst/>
+          </a:prstGeom>
           <a:solidFill>
             <a:schemeClr val="accent1"/>
           </a:solidFill>
+          <a:ln>
+            <a:noFill/>
+          </a:ln>
         </p:spPr>
-        <p:txBody>
-          <a:bodyPr anchor="t"/>
+        <p:style>
+          <a:lnRef idx="2">
+            <a:schemeClr val="accent1">
+              <a:shade val="50000"/>
+            </a:schemeClr>
+          </a:lnRef>
+          <a:fillRef idx="1">
+            <a:schemeClr val="accent1"/>
+          </a:fillRef>
+          <a:effectRef idx="0">
+            <a:schemeClr val="accent1"/>
+          </a:effectRef>
+          <a:fontRef idx="minor">
+            <a:schemeClr val="lt1"/>
+          </a:fontRef>
+        </p:style>
+      </p:sp>
+      <p:sp>
+        <p:nvSpPr>
+          <p:cNvPr id="2" name="Title 1"/>
+          <p:cNvSpPr>
+            <a:spLocks noGrp="1"/>
+          </p:cNvSpPr>
+          <p:nvPr>
+            <p:ph type="title"/>
+          </p:nvPr>
+        </p:nvSpPr>
+        <p:spPr>
+          <a:xfrm>
+            <a:off x="822960" y="5074920"/>
+            <a:ext cx="7589520" cy="822960"/>
+          </a:xfrm>
+        </p:spPr>
+        <p:txBody>
+          <a:bodyPr tIns="0" bIns="0" anchor="b">
+            <a:noAutofit/>
+          </a:bodyPr>
+          <a:lstStyle>
+            <a:lvl1pPr>
+              <a:defRPr sz="3600" b="0">
+                <a:solidFill>
+                  <a:srgbClr val="FFFFFF"/>
+                </a:solidFill>
+              </a:defRPr>
+            </a:lvl1pPr>
+          </a:lstStyle>
+          <a:p>
+            <a:r>
+              <a:rPr lang="en-US"/>
+              <a:t>Click to edit Master title style</a:t>
+            </a:r>
+            <a:endParaRPr lang="en-US" dirty="0"/>
+          </a:p>
+        </p:txBody>
+      </p:sp>
+      <p:sp>
+        <p:nvSpPr>
+          <p:cNvPr id="3" name="Picture Placeholder 2"/>
+          <p:cNvSpPr>
+            <a:spLocks noGrp="1" noChangeAspect="1"/>
+          </p:cNvSpPr>
+          <p:nvPr>
+            <p:ph type="pic" idx="1"/>
+          </p:nvPr>
+        </p:nvSpPr>
+        <p:spPr>
+          <a:xfrm>
+            <a:off x="12" y="0"/>
+            <a:ext cx="9143989" cy="4915076"/>
+          </a:xfrm>
+          <a:blipFill>
+            <a:blip r:embed="rId2"/>
+            <a:stretch>
+              <a:fillRect/>
+            </a:stretch>
+          </a:blipFill>
+        </p:spPr>
+        <p:txBody>
+          <a:bodyPr lIns="457200" tIns="457200" anchor="t"/>
           <a:lstStyle>
             <a:lvl1pPr marL="0" indent="0">
               <a:buNone/>
@@ -2969,28 +3282,26 @@
         </p:nvSpPr>
         <p:spPr>
           <a:xfrm>
-            <a:off x="685800" y="6108590"/>
-            <a:ext cx="7486650" cy="597011"/>
+            <a:off x="822959" y="5907024"/>
+            <a:ext cx="7589520" cy="594360"/>
           </a:xfrm>
         </p:spPr>
         <p:txBody>
-          <a:bodyPr>
+          <a:bodyPr lIns="91440" tIns="0" rIns="91440" bIns="0">
             <a:normAutofit/>
           </a:bodyPr>
           <a:lstStyle>
             <a:lvl1pPr marL="0" indent="0">
-              <a:lnSpc>
-                <a:spcPct val="100000"/>
-              </a:lnSpc>
               <a:spcBef>
-                <a:spcPts val="800"/>
+                <a:spcPts val="0"/>
               </a:spcBef>
-              <a:buNone/>
-              <a:defRPr sz="1300">
+              <a:spcAft>
+                <a:spcPts val="600"/>
+              </a:spcAft>
+              <a:buNone/>
+              <a:defRPr sz="1500">
                 <a:solidFill>
-                  <a:schemeClr val="bg1">
-                    <a:lumMod val="85000"/>
-                  </a:schemeClr>
+                  <a:srgbClr val="FFFFFF"/>
                 </a:solidFill>
               </a:defRPr>
             </a:lvl1pPr>
@@ -3053,7 +3364,7 @@
           <a:p>
             <a:fld id="{5BCAD085-E8A6-8845-BD4E-CB4CCA059FC4}" type="datetimeFigureOut">
               <a:rPr lang="en-US" smtClean="0"/>
-              <a:t>11/4/2023</a:t>
+              <a:t>11/5/2023</a:t>
             </a:fld>
             <a:endParaRPr lang="en-US"/>
           </a:p>
@@ -3074,7 +3385,7 @@
           <a:bodyPr/>
           <a:lstStyle/>
           <a:p>
-            <a:endParaRPr lang="en-US" dirty="0"/>
+            <a:endParaRPr lang="en-US"/>
           </a:p>
         </p:txBody>
       </p:sp>
@@ -3104,7 +3415,7 @@
     </p:spTree>
     <p:extLst>
       <p:ext uri="{BB962C8B-B14F-4D97-AF65-F5344CB8AC3E}">
-        <p14:creationId xmlns:p14="http://schemas.microsoft.com/office/powerpoint/2010/main" val="19353711"/>
+        <p14:creationId xmlns:p14="http://schemas.microsoft.com/office/powerpoint/2010/main" val="3311079543"/>
       </p:ext>
     </p:extLst>
   </p:cSld>
@@ -3144,16 +3455,14 @@
         </p:nvSpPr>
         <p:spPr>
           <a:xfrm>
-            <a:off x="8418195" y="0"/>
-            <a:ext cx="731520" cy="6858000"/>
+            <a:off x="0" y="6400800"/>
+            <a:ext cx="9144001" cy="457200"/>
           </a:xfrm>
           <a:prstGeom prst="rect">
             <a:avLst/>
           </a:prstGeom>
           <a:solidFill>
-            <a:schemeClr val="tx2">
-              <a:lumMod val="75000"/>
-            </a:schemeClr>
+            <a:schemeClr val="accent2"/>
           </a:solidFill>
           <a:ln>
             <a:noFill/>
@@ -3178,18 +3487,56 @@
       </p:sp>
       <p:sp>
         <p:nvSpPr>
-          <p:cNvPr id="2" name="Title Placeholder 1"/>
-          <p:cNvSpPr>
-            <a:spLocks noGrp="1"/>
-          </p:cNvSpPr>
-          <p:nvPr>
-            <p:ph type="title"/>
-          </p:nvPr>
+          <p:cNvPr id="9" name="Rectangle 8"/>
+          <p:cNvSpPr/>
+          <p:nvPr/>
         </p:nvSpPr>
         <p:spPr>
           <a:xfrm>
-            <a:off x="946404" y="365760"/>
-            <a:ext cx="7269480" cy="1325562"/>
+            <a:off x="0" y="6334315"/>
+            <a:ext cx="9144001" cy="65999"/>
+          </a:xfrm>
+          <a:prstGeom prst="rect">
+            <a:avLst/>
+          </a:prstGeom>
+          <a:solidFill>
+            <a:schemeClr val="accent1"/>
+          </a:solidFill>
+          <a:ln>
+            <a:noFill/>
+          </a:ln>
+        </p:spPr>
+        <p:style>
+          <a:lnRef idx="2">
+            <a:schemeClr val="accent1">
+              <a:shade val="50000"/>
+            </a:schemeClr>
+          </a:lnRef>
+          <a:fillRef idx="1">
+            <a:schemeClr val="accent1"/>
+          </a:fillRef>
+          <a:effectRef idx="0">
+            <a:schemeClr val="accent1"/>
+          </a:effectRef>
+          <a:fontRef idx="minor">
+            <a:schemeClr val="lt1"/>
+          </a:fontRef>
+        </p:style>
+      </p:sp>
+      <p:sp>
+        <p:nvSpPr>
+          <p:cNvPr id="2" name="Title Placeholder 1"/>
+          <p:cNvSpPr>
+            <a:spLocks noGrp="1"/>
+          </p:cNvSpPr>
+          <p:nvPr>
+            <p:ph type="title"/>
+          </p:nvPr>
+        </p:nvSpPr>
+        <p:spPr>
+          <a:xfrm>
+            <a:off x="822960" y="286604"/>
+            <a:ext cx="7543800" cy="1450757"/>
           </a:xfrm>
           <a:prstGeom prst="rect">
             <a:avLst/>
@@ -3221,15 +3568,15 @@
         </p:nvSpPr>
         <p:spPr>
           <a:xfrm>
-            <a:off x="946404" y="1828801"/>
-            <a:ext cx="6446520" cy="4351337"/>
+            <a:off x="822959" y="1845734"/>
+            <a:ext cx="7543801" cy="4023360"/>
           </a:xfrm>
           <a:prstGeom prst="rect">
             <a:avLst/>
           </a:prstGeom>
         </p:spPr>
         <p:txBody>
-          <a:bodyPr vert="horz" lIns="91440" tIns="45720" rIns="91440" bIns="45720" rtlCol="0">
+          <a:bodyPr vert="horz" lIns="0" tIns="45720" rIns="0" bIns="45720" rtlCol="0">
             <a:normAutofit/>
           </a:bodyPr>
           <a:lstStyle/>
@@ -3282,9 +3629,9 @@
           </p:nvPr>
         </p:nvSpPr>
         <p:spPr>
-          <a:xfrm rot="16200000">
-            <a:off x="7831456" y="1044178"/>
-            <a:ext cx="1904999" cy="273844"/>
+          <a:xfrm>
+            <a:off x="822961" y="6459786"/>
+            <a:ext cx="1854203" cy="365125"/>
           </a:xfrm>
           <a:prstGeom prst="rect">
             <a:avLst/>
@@ -3293,13 +3640,10 @@
         <p:txBody>
           <a:bodyPr vert="horz" lIns="91440" tIns="45720" rIns="91440" bIns="45720" rtlCol="0" anchor="ctr"/>
           <a:lstStyle>
-            <a:lvl1pPr algn="r">
-              <a:defRPr sz="1050" b="0">
+            <a:lvl1pPr algn="l">
+              <a:defRPr sz="900">
                 <a:solidFill>
-                  <a:schemeClr val="tx2">
-                    <a:lumMod val="20000"/>
-                    <a:lumOff val="80000"/>
-                  </a:schemeClr>
+                  <a:srgbClr val="FFFFFF"/>
                 </a:solidFill>
               </a:defRPr>
             </a:lvl1pPr>
@@ -3307,7 +3651,7 @@
           <a:p>
             <a:fld id="{5BCAD085-E8A6-8845-BD4E-CB4CCA059FC4}" type="datetimeFigureOut">
               <a:rPr lang="en-US" smtClean="0"/>
-              <a:t>11/4/2023</a:t>
+              <a:t>11/5/2023</a:t>
             </a:fld>
             <a:endParaRPr lang="en-US"/>
           </a:p>
@@ -3324,9 +3668,9 @@
           </p:nvPr>
         </p:nvSpPr>
         <p:spPr>
-          <a:xfrm rot="16200000">
-            <a:off x="6993255" y="4092178"/>
-            <a:ext cx="3581400" cy="273844"/>
+          <a:xfrm>
+            <a:off x="2764639" y="6459786"/>
+            <a:ext cx="3617103" cy="365125"/>
           </a:xfrm>
           <a:prstGeom prst="rect">
             <a:avLst/>
@@ -3335,13 +3679,10 @@
         <p:txBody>
           <a:bodyPr vert="horz" lIns="91440" tIns="45720" rIns="91440" bIns="45720" rtlCol="0" anchor="ctr"/>
           <a:lstStyle>
-            <a:lvl1pPr algn="l">
-              <a:defRPr sz="1050">
+            <a:lvl1pPr algn="ctr">
+              <a:defRPr sz="900" cap="all" baseline="0">
                 <a:solidFill>
-                  <a:schemeClr val="tx2">
-                    <a:lumMod val="20000"/>
-                    <a:lumOff val="80000"/>
-                  </a:schemeClr>
+                  <a:srgbClr val="FFFFFF"/>
                 </a:solidFill>
               </a:defRPr>
             </a:lvl1pPr>
@@ -3363,25 +3704,20 @@
         </p:nvSpPr>
         <p:spPr>
           <a:xfrm>
-            <a:off x="8441055" y="6172201"/>
-            <a:ext cx="685800" cy="593725"/>
+            <a:off x="7425344" y="6459786"/>
+            <a:ext cx="984019" cy="365125"/>
           </a:xfrm>
           <a:prstGeom prst="rect">
             <a:avLst/>
           </a:prstGeom>
         </p:spPr>
         <p:txBody>
-          <a:bodyPr vert="horz" lIns="27432" tIns="45720" rIns="27432" bIns="45720" rtlCol="0" anchor="ctr">
-            <a:normAutofit/>
-          </a:bodyPr>
+          <a:bodyPr vert="horz" lIns="91440" tIns="45720" rIns="91440" bIns="45720" rtlCol="0" anchor="ctr"/>
           <a:lstStyle>
-            <a:lvl1pPr algn="ctr">
-              <a:defRPr sz="3200">
+            <a:lvl1pPr algn="r">
+              <a:defRPr sz="1050">
                 <a:solidFill>
-                  <a:schemeClr val="tx2">
-                    <a:lumMod val="60000"/>
-                    <a:lumOff val="40000"/>
-                  </a:schemeClr>
+                  <a:srgbClr val="FFFFFF"/>
                 </a:solidFill>
               </a:defRPr>
             </a:lvl1pPr>
@@ -3395,40 +3731,81 @@
           </a:p>
         </p:txBody>
       </p:sp>
+      <p:cxnSp>
+        <p:nvCxnSpPr>
+          <p:cNvPr id="10" name="Straight Connector 9"/>
+          <p:cNvCxnSpPr/>
+          <p:nvPr/>
+        </p:nvCxnSpPr>
+        <p:spPr>
+          <a:xfrm>
+            <a:off x="895149" y="1737845"/>
+            <a:ext cx="7475220" cy="0"/>
+          </a:xfrm>
+          <a:prstGeom prst="line">
+            <a:avLst/>
+          </a:prstGeom>
+          <a:ln w="6350">
+            <a:solidFill>
+              <a:schemeClr val="tx1">
+                <a:lumMod val="50000"/>
+                <a:lumOff val="50000"/>
+              </a:schemeClr>
+            </a:solidFill>
+          </a:ln>
+        </p:spPr>
+        <p:style>
+          <a:lnRef idx="1">
+            <a:schemeClr val="accent1"/>
+          </a:lnRef>
+          <a:fillRef idx="0">
+            <a:schemeClr val="accent1"/>
+          </a:fillRef>
+          <a:effectRef idx="0">
+            <a:schemeClr val="accent1"/>
+          </a:effectRef>
+          <a:fontRef idx="minor">
+            <a:schemeClr val="tx1"/>
+          </a:fontRef>
+        </p:style>
+      </p:cxnSp>
     </p:spTree>
     <p:extLst>
       <p:ext uri="{BB962C8B-B14F-4D97-AF65-F5344CB8AC3E}">
-        <p14:creationId xmlns:p14="http://schemas.microsoft.com/office/powerpoint/2010/main" val="3880014155"/>
+        <p14:creationId xmlns:p14="http://schemas.microsoft.com/office/powerpoint/2010/main" val="3015148509"/>
       </p:ext>
     </p:extLst>
   </p:cSld>
   <p:clrMap bg1="lt1" tx1="dk1" bg2="lt2" tx2="dk2" accent1="accent1" accent2="accent2" accent3="accent3" accent4="accent4" accent5="accent5" accent6="accent6" hlink="hlink" folHlink="folHlink"/>
   <p:sldLayoutIdLst>
-    <p:sldLayoutId id="2147483803" r:id="rId1"/>
-    <p:sldLayoutId id="2147483804" r:id="rId2"/>
-    <p:sldLayoutId id="2147483805" r:id="rId3"/>
-    <p:sldLayoutId id="2147483806" r:id="rId4"/>
-    <p:sldLayoutId id="2147483807" r:id="rId5"/>
-    <p:sldLayoutId id="2147483808" r:id="rId6"/>
-    <p:sldLayoutId id="2147483809" r:id="rId7"/>
-    <p:sldLayoutId id="2147483810" r:id="rId8"/>
-    <p:sldLayoutId id="2147483811" r:id="rId9"/>
-    <p:sldLayoutId id="2147483812" r:id="rId10"/>
-    <p:sldLayoutId id="2147483813" r:id="rId11"/>
+    <p:sldLayoutId id="2147483869" r:id="rId1"/>
+    <p:sldLayoutId id="2147483870" r:id="rId2"/>
+    <p:sldLayoutId id="2147483871" r:id="rId3"/>
+    <p:sldLayoutId id="2147483872" r:id="rId4"/>
+    <p:sldLayoutId id="2147483873" r:id="rId5"/>
+    <p:sldLayoutId id="2147483874" r:id="rId6"/>
+    <p:sldLayoutId id="2147483875" r:id="rId7"/>
+    <p:sldLayoutId id="2147483876" r:id="rId8"/>
+    <p:sldLayoutId id="2147483877" r:id="rId9"/>
+    <p:sldLayoutId id="2147483878" r:id="rId10"/>
+    <p:sldLayoutId id="2147483879" r:id="rId11"/>
   </p:sldLayoutIdLst>
   <p:txStyles>
     <p:titleStyle>
       <a:lvl1pPr algn="l" defTabSz="914400" rtl="0" eaLnBrk="1" latinLnBrk="0" hangingPunct="1">
         <a:lnSpc>
-          <a:spcPct val="90000"/>
+          <a:spcPct val="85000"/>
         </a:lnSpc>
         <a:spcBef>
           <a:spcPct val="0"/>
         </a:spcBef>
         <a:buNone/>
-        <a:defRPr sz="4000" kern="1200" spc="-50" baseline="0">
+        <a:defRPr sz="4800" kern="1200" spc="-50" baseline="0">
           <a:solidFill>
-            <a:schemeClr val="tx1"/>
+            <a:schemeClr val="tx1">
+              <a:lumMod val="75000"/>
+              <a:lumOff val="25000"/>
+            </a:schemeClr>
           </a:solidFill>
           <a:latin typeface="+mj-lt"/>
           <a:ea typeface="+mj-ea"/>
@@ -3437,12 +3814,12 @@
       </a:lvl1pPr>
     </p:titleStyle>
     <p:bodyStyle>
-      <a:lvl1pPr marL="182880" indent="-182880" algn="l" defTabSz="914400" rtl="0" eaLnBrk="1" latinLnBrk="0" hangingPunct="1">
+      <a:lvl1pPr marL="91440" indent="-91440" algn="l" defTabSz="914400" rtl="0" eaLnBrk="1" latinLnBrk="0" hangingPunct="1">
         <a:lnSpc>
-          <a:spcPct val="95000"/>
+          <a:spcPct val="90000"/>
         </a:lnSpc>
         <a:spcBef>
-          <a:spcPts val="1400"/>
+          <a:spcPts val="1200"/>
         </a:spcBef>
         <a:spcAft>
           <a:spcPts val="200"/>
@@ -3450,38 +3827,41 @@
         <a:buClr>
           <a:schemeClr val="accent1"/>
         </a:buClr>
-        <a:buSzPct val="80000"/>
-        <a:buFont typeface="Arial" pitchFamily="34" charset="0"/>
-        <a:buChar char="•"/>
-        <a:defRPr sz="1800" kern="1200" spc="10" baseline="0">
+        <a:buSzPct val="100000"/>
+        <a:buFont typeface="Calibri" panose="020F0502020204030204" pitchFamily="34" charset="0"/>
+        <a:buChar char=" "/>
+        <a:defRPr sz="2000" kern="1200">
           <a:solidFill>
-            <a:schemeClr val="tx1"/>
+            <a:schemeClr val="tx1">
+              <a:lumMod val="75000"/>
+              <a:lumOff val="25000"/>
+            </a:schemeClr>
           </a:solidFill>
           <a:latin typeface="+mn-lt"/>
           <a:ea typeface="+mn-ea"/>
           <a:cs typeface="+mn-cs"/>
         </a:defRPr>
       </a:lvl1pPr>
-      <a:lvl2pPr marL="457200" indent="-182880" algn="l" defTabSz="914400" rtl="0" eaLnBrk="1" latinLnBrk="0" hangingPunct="1">
+      <a:lvl2pPr marL="384048" indent="-182880" algn="l" defTabSz="914400" rtl="0" eaLnBrk="1" latinLnBrk="0" hangingPunct="1">
         <a:lnSpc>
           <a:spcPct val="90000"/>
         </a:lnSpc>
         <a:spcBef>
-          <a:spcPts val="300"/>
+          <a:spcPts val="200"/>
         </a:spcBef>
         <a:spcAft>
-          <a:spcPts val="300"/>
+          <a:spcPts val="400"/>
         </a:spcAft>
         <a:buClr>
           <a:schemeClr val="accent1"/>
         </a:buClr>
-        <a:buFont typeface="Wingdings 2" pitchFamily="18" charset="2"/>
-        <a:buChar char=""/>
-        <a:defRPr sz="1600" kern="1200">
+        <a:buFont typeface="Calibri" pitchFamily="34" charset="0"/>
+        <a:buChar char="◦"/>
+        <a:defRPr sz="1800" kern="1200">
           <a:solidFill>
             <a:schemeClr val="tx1">
-              <a:lumMod val="85000"/>
-              <a:lumOff val="15000"/>
+              <a:lumMod val="75000"/>
+              <a:lumOff val="25000"/>
             </a:schemeClr>
           </a:solidFill>
           <a:latin typeface="+mn-lt"/>
@@ -3489,26 +3869,26 @@
           <a:cs typeface="+mn-cs"/>
         </a:defRPr>
       </a:lvl2pPr>
-      <a:lvl3pPr marL="731520" indent="-182880" algn="l" defTabSz="914400" rtl="0" eaLnBrk="1" latinLnBrk="0" hangingPunct="1">
+      <a:lvl3pPr marL="566928" indent="-182880" algn="l" defTabSz="914400" rtl="0" eaLnBrk="1" latinLnBrk="0" hangingPunct="1">
         <a:lnSpc>
           <a:spcPct val="90000"/>
         </a:lnSpc>
         <a:spcBef>
-          <a:spcPts val="300"/>
+          <a:spcPts val="200"/>
         </a:spcBef>
         <a:spcAft>
-          <a:spcPts val="300"/>
+          <a:spcPts val="400"/>
         </a:spcAft>
         <a:buClr>
           <a:schemeClr val="accent1"/>
         </a:buClr>
-        <a:buFont typeface="Wingdings 2" pitchFamily="18" charset="2"/>
-        <a:buChar char=""/>
+        <a:buFont typeface="Calibri" pitchFamily="34" charset="0"/>
+        <a:buChar char="◦"/>
         <a:defRPr sz="1400" kern="1200">
           <a:solidFill>
             <a:schemeClr val="tx1">
-              <a:lumMod val="85000"/>
-              <a:lumOff val="15000"/>
+              <a:lumMod val="75000"/>
+              <a:lumOff val="25000"/>
             </a:schemeClr>
           </a:solidFill>
           <a:latin typeface="+mn-lt"/>
@@ -3516,26 +3896,26 @@
           <a:cs typeface="+mn-cs"/>
         </a:defRPr>
       </a:lvl3pPr>
-      <a:lvl4pPr marL="1005840" indent="-182880" algn="l" defTabSz="914400" rtl="0" eaLnBrk="1" latinLnBrk="0" hangingPunct="1">
+      <a:lvl4pPr marL="749808" indent="-182880" algn="l" defTabSz="914400" rtl="0" eaLnBrk="1" latinLnBrk="0" hangingPunct="1">
         <a:lnSpc>
           <a:spcPct val="90000"/>
         </a:lnSpc>
         <a:spcBef>
-          <a:spcPts val="300"/>
+          <a:spcPts val="200"/>
         </a:spcBef>
         <a:spcAft>
-          <a:spcPts val="300"/>
+          <a:spcPts val="400"/>
         </a:spcAft>
         <a:buClr>
           <a:schemeClr val="accent1"/>
         </a:buClr>
-        <a:buFont typeface="Wingdings 2" pitchFamily="18" charset="2"/>
-        <a:buChar char=""/>
+        <a:buFont typeface="Calibri" pitchFamily="34" charset="0"/>
+        <a:buChar char="◦"/>
         <a:defRPr sz="1400" kern="1200">
           <a:solidFill>
             <a:schemeClr val="tx1">
-              <a:lumMod val="85000"/>
-              <a:lumOff val="15000"/>
+              <a:lumMod val="75000"/>
+              <a:lumOff val="25000"/>
             </a:schemeClr>
           </a:solidFill>
           <a:latin typeface="+mn-lt"/>
@@ -3543,26 +3923,26 @@
           <a:cs typeface="+mn-cs"/>
         </a:defRPr>
       </a:lvl4pPr>
-      <a:lvl5pPr marL="1280160" indent="-182880" algn="l" defTabSz="914400" rtl="0" eaLnBrk="1" latinLnBrk="0" hangingPunct="1">
+      <a:lvl5pPr marL="932688" indent="-182880" algn="l" defTabSz="914400" rtl="0" eaLnBrk="1" latinLnBrk="0" hangingPunct="1">
         <a:lnSpc>
           <a:spcPct val="90000"/>
         </a:lnSpc>
         <a:spcBef>
-          <a:spcPts val="300"/>
+          <a:spcPts val="200"/>
         </a:spcBef>
         <a:spcAft>
-          <a:spcPts val="300"/>
+          <a:spcPts val="400"/>
         </a:spcAft>
         <a:buClr>
           <a:schemeClr val="accent1"/>
         </a:buClr>
-        <a:buFont typeface="Wingdings 2" pitchFamily="18" charset="2"/>
-        <a:buChar char=""/>
+        <a:buFont typeface="Calibri" pitchFamily="34" charset="0"/>
+        <a:buChar char="◦"/>
         <a:defRPr sz="1400" kern="1200">
           <a:solidFill>
             <a:schemeClr val="tx1">
-              <a:lumMod val="85000"/>
-              <a:lumOff val="15000"/>
+              <a:lumMod val="75000"/>
+              <a:lumOff val="25000"/>
             </a:schemeClr>
           </a:solidFill>
           <a:latin typeface="+mn-lt"/>
@@ -3570,26 +3950,26 @@
           <a:cs typeface="+mn-cs"/>
         </a:defRPr>
       </a:lvl5pPr>
-      <a:lvl6pPr marL="1600000" indent="-228600" algn="l" defTabSz="914400" rtl="0" eaLnBrk="1" latinLnBrk="0" hangingPunct="1">
+      <a:lvl6pPr marL="1100000" indent="-228600" algn="l" defTabSz="914400" rtl="0" eaLnBrk="1" latinLnBrk="0" hangingPunct="1">
         <a:lnSpc>
           <a:spcPct val="90000"/>
         </a:lnSpc>
         <a:spcBef>
-          <a:spcPts val="300"/>
+          <a:spcPts val="200"/>
         </a:spcBef>
         <a:spcAft>
-          <a:spcPts val="300"/>
+          <a:spcPts val="400"/>
         </a:spcAft>
         <a:buClr>
           <a:schemeClr val="accent1"/>
         </a:buClr>
-        <a:buFont typeface="Wingdings 2" pitchFamily="18" charset="2"/>
-        <a:buChar char=""/>
+        <a:buFont typeface="Calibri" pitchFamily="34" charset="0"/>
+        <a:buChar char="◦"/>
         <a:defRPr sz="1400" kern="1200">
           <a:solidFill>
             <a:schemeClr val="tx1">
-              <a:lumMod val="85000"/>
-              <a:lumOff val="15000"/>
+              <a:lumMod val="75000"/>
+              <a:lumOff val="25000"/>
             </a:schemeClr>
           </a:solidFill>
           <a:latin typeface="+mn-lt"/>
@@ -3597,26 +3977,26 @@
           <a:cs typeface="+mn-cs"/>
         </a:defRPr>
       </a:lvl6pPr>
-      <a:lvl7pPr marL="1900000" indent="-228600" algn="l" defTabSz="914400" rtl="0" eaLnBrk="1" latinLnBrk="0" hangingPunct="1">
+      <a:lvl7pPr marL="1300000" indent="-228600" algn="l" defTabSz="914400" rtl="0" eaLnBrk="1" latinLnBrk="0" hangingPunct="1">
         <a:lnSpc>
           <a:spcPct val="90000"/>
         </a:lnSpc>
         <a:spcBef>
-          <a:spcPts val="300"/>
+          <a:spcPts val="200"/>
         </a:spcBef>
         <a:spcAft>
-          <a:spcPts val="300"/>
+          <a:spcPts val="400"/>
         </a:spcAft>
         <a:buClr>
           <a:schemeClr val="accent1"/>
         </a:buClr>
-        <a:buFont typeface="Wingdings 2" pitchFamily="18" charset="2"/>
-        <a:buChar char=""/>
+        <a:buFont typeface="Calibri" pitchFamily="34" charset="0"/>
+        <a:buChar char="◦"/>
         <a:defRPr sz="1400" kern="1200">
           <a:solidFill>
             <a:schemeClr val="tx1">
-              <a:lumMod val="85000"/>
-              <a:lumOff val="15000"/>
+              <a:lumMod val="75000"/>
+              <a:lumOff val="25000"/>
             </a:schemeClr>
           </a:solidFill>
           <a:latin typeface="+mn-lt"/>
@@ -3624,26 +4004,26 @@
           <a:cs typeface="+mn-cs"/>
         </a:defRPr>
       </a:lvl7pPr>
-      <a:lvl8pPr marL="2200000" indent="-228600" algn="l" defTabSz="914400" rtl="0" eaLnBrk="1" latinLnBrk="0" hangingPunct="1">
+      <a:lvl8pPr marL="1500000" indent="-228600" algn="l" defTabSz="914400" rtl="0" eaLnBrk="1" latinLnBrk="0" hangingPunct="1">
         <a:lnSpc>
           <a:spcPct val="90000"/>
         </a:lnSpc>
         <a:spcBef>
-          <a:spcPts val="300"/>
+          <a:spcPts val="200"/>
         </a:spcBef>
         <a:spcAft>
-          <a:spcPts val="300"/>
+          <a:spcPts val="400"/>
         </a:spcAft>
         <a:buClr>
           <a:schemeClr val="accent1"/>
         </a:buClr>
-        <a:buFont typeface="Wingdings 2" pitchFamily="18" charset="2"/>
-        <a:buChar char=""/>
+        <a:buFont typeface="Calibri" pitchFamily="34" charset="0"/>
+        <a:buChar char="◦"/>
         <a:defRPr sz="1400" kern="1200">
           <a:solidFill>
             <a:schemeClr val="tx1">
-              <a:lumMod val="85000"/>
-              <a:lumOff val="15000"/>
+              <a:lumMod val="75000"/>
+              <a:lumOff val="25000"/>
             </a:schemeClr>
           </a:solidFill>
           <a:latin typeface="+mn-lt"/>
@@ -3651,26 +4031,26 @@
           <a:cs typeface="+mn-cs"/>
         </a:defRPr>
       </a:lvl8pPr>
-      <a:lvl9pPr marL="2500000" indent="-228600" algn="l" defTabSz="914400" rtl="0" eaLnBrk="1" latinLnBrk="0" hangingPunct="1">
+      <a:lvl9pPr marL="1700000" indent="-228600" algn="l" defTabSz="914400" rtl="0" eaLnBrk="1" latinLnBrk="0" hangingPunct="1">
         <a:lnSpc>
           <a:spcPct val="90000"/>
         </a:lnSpc>
         <a:spcBef>
-          <a:spcPts val="300"/>
+          <a:spcPts val="200"/>
         </a:spcBef>
         <a:spcAft>
-          <a:spcPts val="300"/>
+          <a:spcPts val="400"/>
         </a:spcAft>
         <a:buClr>
           <a:schemeClr val="accent1"/>
         </a:buClr>
-        <a:buFont typeface="Wingdings 2" pitchFamily="18" charset="2"/>
-        <a:buChar char=""/>
+        <a:buFont typeface="Calibri" pitchFamily="34" charset="0"/>
+        <a:buChar char="◦"/>
         <a:defRPr sz="1400" kern="1200">
           <a:solidFill>
             <a:schemeClr val="tx1">
-              <a:lumMod val="85000"/>
-              <a:lumOff val="15000"/>
+              <a:lumMod val="75000"/>
+              <a:lumOff val="25000"/>
             </a:schemeClr>
           </a:solidFill>
           <a:latin typeface="+mn-lt"/>
@@ -3831,7 +4211,7 @@
         <p:spPr>
           <a:xfrm>
             <a:off x="0" y="0"/>
-            <a:ext cx="9144000" cy="6858000"/>
+            <a:ext cx="9144000" cy="4690872"/>
           </a:xfrm>
           <a:prstGeom prst="rect">
             <a:avLst/>
@@ -4286,7 +4666,7 @@
         <p:spPr>
           <a:xfrm>
             <a:off x="0" y="0"/>
-            <a:ext cx="9144000" cy="6858000"/>
+            <a:ext cx="9144000" cy="4672584"/>
           </a:xfrm>
           <a:prstGeom prst="rect">
             <a:avLst/>
@@ -4307,58 +4687,93 @@
 </file>
 
 <file path=ppt/theme/theme1.xml><?xml version="1.0" encoding="utf-8"?>
-<a:theme xmlns:a="http://schemas.openxmlformats.org/drawingml/2006/main" name="View">
+<a:theme xmlns:a="http://schemas.openxmlformats.org/drawingml/2006/main" name="Retrospect">
   <a:themeElements>
-    <a:clrScheme name="View">
+    <a:clrScheme name="Retrospect">
       <a:dk1>
         <a:srgbClr val="000000"/>
       </a:dk1>
       <a:lt1>
-        <a:srgbClr val="FFFFFF"/>
+        <a:sysClr val="window" lastClr="FFFFFF"/>
       </a:lt1>
       <a:dk2>
-        <a:srgbClr val="46464A"/>
+        <a:srgbClr val="637052"/>
       </a:dk2>
       <a:lt2>
-        <a:srgbClr val="D6D3CC"/>
+        <a:srgbClr val="CCDDEA"/>
       </a:lt2>
       <a:accent1>
-        <a:srgbClr val="6F6F74"/>
+        <a:srgbClr val="E48312"/>
       </a:accent1>
       <a:accent2>
-        <a:srgbClr val="92A9B9"/>
+        <a:srgbClr val="BD582C"/>
       </a:accent2>
       <a:accent3>
-        <a:srgbClr val="A7B789"/>
+        <a:srgbClr val="865640"/>
       </a:accent3>
       <a:accent4>
-        <a:srgbClr val="B9A489"/>
+        <a:srgbClr val="9B8357"/>
       </a:accent4>
       <a:accent5>
-        <a:srgbClr val="8D6374"/>
+        <a:srgbClr val="C2BC80"/>
       </a:accent5>
       <a:accent6>
-        <a:srgbClr val="9B7362"/>
+        <a:srgbClr val="94A088"/>
       </a:accent6>
       <a:hlink>
-        <a:srgbClr val="67AABF"/>
+        <a:srgbClr val="2998E3"/>
       </a:hlink>
       <a:folHlink>
-        <a:srgbClr val="ABAFA5"/>
+        <a:srgbClr val="8C8C8C"/>
       </a:folHlink>
     </a:clrScheme>
-    <a:fontScheme name="View">
+    <a:fontScheme name="Retrospect">
       <a:majorFont>
-        <a:latin typeface="Century Schoolbook" panose="02040604050505020304"/>
+        <a:latin typeface="Calibri Light" panose="020F0302020204030204"/>
         <a:ea typeface=""/>
         <a:cs typeface=""/>
-        <a:font script="Jpan" typeface="ＭＳ ゴシック"/>
+        <a:font script="Jpan" typeface="ＭＳ Ｐゴシック"/>
         <a:font script="Hang" typeface="맑은 고딕"/>
         <a:font script="Hans" typeface="宋体"/>
         <a:font script="Hant" typeface="新細明體"/>
-        <a:font script="Arab" typeface="Tahoma"/>
-        <a:font script="Hebr" typeface="Gisha"/>
-        <a:font script="Thai" typeface="DilleniaUPC"/>
+        <a:font script="Arab" typeface="Times New Roman"/>
+        <a:font script="Hebr" typeface="Times New Roman"/>
+        <a:font script="Thai" typeface="Angsana New"/>
+        <a:font script="Ethi" typeface="Nyala"/>
+        <a:font script="Beng" typeface="Vrinda"/>
+        <a:font script="Gujr" typeface="Shruti"/>
+        <a:font script="Khmr" typeface="MoolBoran"/>
+        <a:font script="Knda" typeface="Tunga"/>
+        <a:font script="Guru" typeface="Raavi"/>
+        <a:font script="Cans" typeface="Euphemia"/>
+        <a:font script="Cher" typeface="Plantagenet Cherokee"/>
+        <a:font script="Yiii" typeface="Microsoft Yi Baiti"/>
+        <a:font script="Tibt" typeface="Microsoft Himalaya"/>
+        <a:font script="Thaa" typeface="MV Boli"/>
+        <a:font script="Deva" typeface="Mangal"/>
+        <a:font script="Telu" typeface="Gautami"/>
+        <a:font script="Taml" typeface="Latha"/>
+        <a:font script="Syrc" typeface="Estrangelo Edessa"/>
+        <a:font script="Orya" typeface="Kalinga"/>
+        <a:font script="Mlym" typeface="Kartika"/>
+        <a:font script="Laoo" typeface="DokChampa"/>
+        <a:font script="Sinh" typeface="Iskoola Pota"/>
+        <a:font script="Mong" typeface="Mongolian Baiti"/>
+        <a:font script="Viet" typeface="Times New Roman"/>
+        <a:font script="Uigh" typeface="Microsoft Uighur"/>
+        <a:font script="Geor" typeface="Sylfaen"/>
+      </a:majorFont>
+      <a:minorFont>
+        <a:latin typeface="Calibri" panose="020F0502020204030204"/>
+        <a:ea typeface=""/>
+        <a:cs typeface=""/>
+        <a:font script="Jpan" typeface="ＭＳ Ｐゴシック"/>
+        <a:font script="Hang" typeface="맑은 고딕"/>
+        <a:font script="Hans" typeface="宋体"/>
+        <a:font script="Hant" typeface="新細明體"/>
+        <a:font script="Arab" typeface="Arial"/>
+        <a:font script="Hebr" typeface="Arial"/>
+        <a:font script="Thai" typeface="Cordia New"/>
         <a:font script="Ethi" typeface="Nyala"/>
         <a:font script="Beng" typeface="Vrinda"/>
         <a:font script="Gujr" typeface="Shruti"/>
@@ -4379,84 +4794,93 @@
         <a:font script="Laoo" typeface="DokChampa"/>
         <a:font script="Sinh" typeface="Iskoola Pota"/>
         <a:font script="Mong" typeface="Mongolian Baiti"/>
-        <a:font script="Viet" typeface="Tahoma"/>
-        <a:font script="Uigh" typeface="Microsoft Uighur"/>
-        <a:font script="Geor" typeface="Sylfaen"/>
-      </a:majorFont>
-      <a:minorFont>
-        <a:latin typeface="Century Schoolbook" panose="02040604050505020304"/>
-        <a:ea typeface=""/>
-        <a:cs typeface=""/>
-        <a:font script="Jpan" typeface="ＭＳ ゴシック"/>
-        <a:font script="Hang" typeface="맑은 고딕"/>
-        <a:font script="Hans" typeface="宋体"/>
-        <a:font script="Hant" typeface="新細明體"/>
-        <a:font script="Arab" typeface="Tahoma"/>
-        <a:font script="Hebr" typeface="Gisha"/>
-        <a:font script="Thai" typeface="DilleniaUPC"/>
-        <a:font script="Ethi" typeface="Nyala"/>
-        <a:font script="Beng" typeface="Vrinda"/>
-        <a:font script="Gujr" typeface="Shruti"/>
-        <a:font script="Khmr" typeface="DaunPenh"/>
-        <a:font script="Knda" typeface="Tunga"/>
-        <a:font script="Guru" typeface="Raavi"/>
-        <a:font script="Cans" typeface="Euphemia"/>
-        <a:font script="Cher" typeface="Plantagenet Cherokee"/>
-        <a:font script="Yiii" typeface="Microsoft Yi Baiti"/>
-        <a:font script="Tibt" typeface="Microsoft Himalaya"/>
-        <a:font script="Thaa" typeface="MV Boli"/>
-        <a:font script="Deva" typeface="Mangal"/>
-        <a:font script="Telu" typeface="Gautami"/>
-        <a:font script="Taml" typeface="Latha"/>
-        <a:font script="Syrc" typeface="Estrangelo Edessa"/>
-        <a:font script="Orya" typeface="Kalinga"/>
-        <a:font script="Mlym" typeface="Kartika"/>
-        <a:font script="Laoo" typeface="DokChampa"/>
-        <a:font script="Sinh" typeface="Iskoola Pota"/>
-        <a:font script="Mong" typeface="Mongolian Baiti"/>
-        <a:font script="Viet" typeface="Verdana"/>
+        <a:font script="Viet" typeface="Arial"/>
         <a:font script="Uigh" typeface="Microsoft Uighur"/>
         <a:font script="Geor" typeface="Sylfaen"/>
       </a:minorFont>
     </a:fontScheme>
-    <a:fmtScheme name="View">
+    <a:fmtScheme name="Retrospect">
       <a:fillStyleLst>
         <a:solidFill>
           <a:schemeClr val="phClr"/>
         </a:solidFill>
-        <a:solidFill>
-          <a:schemeClr val="phClr">
-            <a:tint val="60000"/>
-            <a:satMod val="120000"/>
-          </a:schemeClr>
-        </a:solidFill>
-        <a:solidFill>
-          <a:schemeClr val="phClr">
-            <a:shade val="75000"/>
-            <a:satMod val="160000"/>
-          </a:schemeClr>
-        </a:solidFill>
+        <a:gradFill rotWithShape="1">
+          <a:gsLst>
+            <a:gs pos="0">
+              <a:schemeClr val="phClr">
+                <a:tint val="65000"/>
+                <a:shade val="92000"/>
+                <a:satMod val="130000"/>
+              </a:schemeClr>
+            </a:gs>
+            <a:gs pos="45000">
+              <a:schemeClr val="phClr">
+                <a:tint val="60000"/>
+                <a:shade val="99000"/>
+                <a:satMod val="120000"/>
+              </a:schemeClr>
+            </a:gs>
+            <a:gs pos="100000">
+              <a:schemeClr val="phClr">
+                <a:tint val="55000"/>
+                <a:satMod val="140000"/>
+              </a:schemeClr>
+            </a:gs>
+          </a:gsLst>
+          <a:path path="circle">
+            <a:fillToRect l="100000" t="100000" r="100000" b="100000"/>
+          </a:path>
+        </a:gradFill>
+        <a:gradFill rotWithShape="1">
+          <a:gsLst>
+            <a:gs pos="0">
+              <a:schemeClr val="phClr">
+                <a:shade val="85000"/>
+                <a:satMod val="130000"/>
+              </a:schemeClr>
+            </a:gs>
+            <a:gs pos="34000">
+              <a:schemeClr val="phClr">
+                <a:shade val="87000"/>
+                <a:satMod val="125000"/>
+              </a:schemeClr>
+            </a:gs>
+            <a:gs pos="70000">
+              <a:schemeClr val="phClr">
+                <a:tint val="100000"/>
+                <a:shade val="90000"/>
+                <a:satMod val="130000"/>
+              </a:schemeClr>
+            </a:gs>
+            <a:gs pos="100000">
+              <a:schemeClr val="phClr">
+                <a:tint val="100000"/>
+                <a:shade val="100000"/>
+                <a:satMod val="110000"/>
+              </a:schemeClr>
+            </a:gs>
+          </a:gsLst>
+          <a:path path="circle">
+            <a:fillToRect l="100000" t="100000" r="100000" b="100000"/>
+          </a:path>
+        </a:gradFill>
       </a:fillStyleLst>
       <a:lnStyleLst>
-        <a:ln w="9525" cap="flat" cmpd="sng" algn="ctr">
+        <a:ln w="12700" cap="flat" cmpd="sng" algn="ctr">
           <a:solidFill>
             <a:schemeClr val="phClr"/>
           </a:solidFill>
           <a:prstDash val="solid"/>
         </a:ln>
-        <a:ln w="13970" cap="flat" cmpd="sng" algn="ctr">
+        <a:ln w="15875" cap="flat" cmpd="sng" algn="ctr">
           <a:solidFill>
             <a:schemeClr val="phClr"/>
           </a:solidFill>
           <a:prstDash val="solid"/>
         </a:ln>
-        <a:ln w="17145" cap="flat" cmpd="sng" algn="ctr">
+        <a:ln w="25400" cap="flat" cmpd="sng" algn="ctr">
           <a:solidFill>
-            <a:schemeClr val="phClr">
-              <a:shade val="95000"/>
-              <a:alpha val="95000"/>
-              <a:satMod val="150000"/>
-            </a:schemeClr>
+            <a:schemeClr val="phClr"/>
           </a:solidFill>
           <a:prstDash val="solid"/>
         </a:ln>
@@ -4467,9 +4891,18 @@
         </a:effectStyle>
         <a:effectStyle>
           <a:effectLst>
-            <a:outerShdw blurRad="50800" dist="15240" dir="5400000" algn="tl" rotWithShape="0">
+            <a:outerShdw blurRad="38100" dist="25400" dir="2700000" algn="br" rotWithShape="0">
               <a:srgbClr val="000000">
-                <a:alpha val="75000"/>
+                <a:alpha val="60000"/>
+              </a:srgbClr>
+            </a:outerShdw>
+          </a:effectLst>
+        </a:effectStyle>
+        <a:effectStyle>
+          <a:effectLst>
+            <a:outerShdw blurRad="44450" dist="25400" dir="2700000" algn="br" rotWithShape="0">
+              <a:srgbClr val="000000">
+                <a:alpha val="60000"/>
               </a:srgbClr>
             </a:outerShdw>
           </a:effectLst>
@@ -4477,40 +4910,12 @@
             <a:camera prst="orthographicFront">
               <a:rot lat="0" lon="0" rev="0"/>
             </a:camera>
-            <a:lightRig rig="brightRoom" dir="tl"/>
+            <a:lightRig rig="threePt" dir="t">
+              <a:rot lat="0" lon="0" rev="19800000"/>
+            </a:lightRig>
           </a:scene3d>
-          <a:sp3d contourW="9525" prstMaterial="flat">
-            <a:bevelT w="0" h="0" prst="coolSlant"/>
-            <a:contourClr>
-              <a:schemeClr val="phClr">
-                <a:shade val="35000"/>
-                <a:satMod val="130000"/>
-              </a:schemeClr>
-            </a:contourClr>
-          </a:sp3d>
-        </a:effectStyle>
-        <a:effectStyle>
-          <a:effectLst>
-            <a:outerShdw blurRad="76200" dist="25400" dir="5400000" algn="tl" rotWithShape="0">
-              <a:srgbClr val="000000">
-                <a:alpha val="55000"/>
-              </a:srgbClr>
-            </a:outerShdw>
-          </a:effectLst>
-          <a:scene3d>
-            <a:camera prst="orthographicFront">
-              <a:rot lat="0" lon="0" rev="0"/>
-            </a:camera>
-            <a:lightRig rig="brightRoom" dir="tl"/>
-          </a:scene3d>
-          <a:sp3d contourW="19050" prstMaterial="flat">
-            <a:bevelT w="0" h="0" prst="coolSlant"/>
-            <a:contourClr>
-              <a:schemeClr val="phClr">
-                <a:shade val="25000"/>
-                <a:satMod val="140000"/>
-              </a:schemeClr>
-            </a:contourClr>
+          <a:sp3d prstMaterial="flat">
+            <a:bevelT w="25400" h="31750"/>
           </a:sp3d>
         </a:effectStyle>
       </a:effectStyleLst>
@@ -4520,31 +4925,36 @@
         </a:solidFill>
         <a:solidFill>
           <a:schemeClr val="phClr">
-            <a:tint val="95000"/>
-            <a:satMod val="170000"/>
+            <a:tint val="90000"/>
+            <a:shade val="97000"/>
+            <a:satMod val="130000"/>
           </a:schemeClr>
         </a:solidFill>
         <a:gradFill rotWithShape="1">
           <a:gsLst>
             <a:gs pos="0">
               <a:schemeClr val="phClr">
-                <a:tint val="94000"/>
-                <a:shade val="98000"/>
+                <a:tint val="96000"/>
+                <a:shade val="99000"/>
+                <a:satMod val="140000"/>
+              </a:schemeClr>
+            </a:gs>
+            <a:gs pos="65000">
+              <a:schemeClr val="phClr">
+                <a:tint val="100000"/>
+                <a:shade val="80000"/>
                 <a:satMod val="130000"/>
-                <a:lumMod val="102000"/>
               </a:schemeClr>
             </a:gs>
             <a:gs pos="100000">
               <a:schemeClr val="phClr">
-                <a:tint val="98000"/>
-                <a:shade val="78000"/>
-                <a:satMod val="140000"/>
+                <a:tint val="100000"/>
+                <a:shade val="48000"/>
+                <a:satMod val="120000"/>
               </a:schemeClr>
             </a:gs>
           </a:gsLst>
-          <a:path path="circle">
-            <a:fillToRect l="100000" t="100000" r="100000" b="100000"/>
-          </a:path>
+          <a:lin ang="16200000" scaled="0"/>
         </a:gradFill>
       </a:bgFillStyleLst>
     </a:fmtScheme>
@@ -4553,7 +4963,7 @@
   <a:extraClrSchemeLst/>
   <a:extLst>
     <a:ext uri="{05A4C25C-085E-4340-85A3-A5531E510DB2}">
-      <thm15:themeFamily xmlns:thm15="http://schemas.microsoft.com/office/thememl/2012/main" name="View" id="{BA0EB5A6-F2D4-4F82-977B-64ADEE4A2A69}" vid="{3969A8A2-35DB-4E3B-8885-16FD20568674}"/>
+      <thm15:themeFamily xmlns:thm15="http://schemas.microsoft.com/office/thememl/2012/main" name="Retrospect" id="{5F128B03-DCCA-4EEB-AB3B-CF2899314A46}" vid="{3F1AAB62-24C6-49D2-8E01-B56FAC9A3DCD}"/>
     </a:ext>
   </a:extLst>
 </a:theme>

</xml_diff>